<commit_message>
add background to my presentation of power point add crosstab validation to my model
</commit_message>
<xml_diff>
--- a/NLP_reviews_cellphones.pptx
+++ b/NLP_reviews_cellphones.pptx
@@ -2521,9 +2521,18 @@
 <p:sldMaster xmlns:a="http://schemas.openxmlformats.org/drawingml/2006/main" xmlns:r="http://schemas.openxmlformats.org/officeDocument/2006/relationships" xmlns:p="http://schemas.openxmlformats.org/presentationml/2006/main">
   <p:cSld>
     <p:bg>
-      <p:bgRef idx="1001">
-        <a:schemeClr val="bg1"/>
-      </p:bgRef>
+      <p:bgPr>
+        <a:blipFill dpi="0" rotWithShape="1">
+          <a:blip r:embed="rId13" cstate="print">
+            <a:lum/>
+          </a:blip>
+          <a:srcRect/>
+          <a:stretch>
+            <a:fillRect/>
+          </a:stretch>
+        </a:blipFill>
+        <a:effectLst/>
+      </p:bgPr>
     </p:bg>
     <p:spTree>
       <p:nvGrpSpPr>
@@ -3049,16 +3058,29 @@
             <p:ph type="ctrTitle"/>
           </p:nvPr>
         </p:nvSpPr>
-        <p:spPr/>
-        <p:txBody>
-          <a:bodyPr/>
-          <a:lstStyle/>
-          <a:p>
-            <a:r>
-              <a:rPr lang="es-MX" dirty="0" smtClean="0"/>
+        <p:spPr>
+          <a:xfrm>
+            <a:off x="762000" y="838200"/>
+            <a:ext cx="7772400" cy="1470025"/>
+          </a:xfrm>
+        </p:spPr>
+        <p:txBody>
+          <a:bodyPr/>
+          <a:lstStyle/>
+          <a:p>
+            <a:r>
+              <a:rPr lang="es-MX" dirty="0" smtClean="0">
+                <a:solidFill>
+                  <a:schemeClr val="bg1"/>
+                </a:solidFill>
+              </a:rPr>
               <a:t>Definición del problema</a:t>
             </a:r>
-            <a:endParaRPr lang="en-US" dirty="0"/>
+            <a:endParaRPr lang="en-US" dirty="0">
+              <a:solidFill>
+                <a:schemeClr val="bg1"/>
+              </a:solidFill>
+            </a:endParaRPr>
           </a:p>
         </p:txBody>
       </p:sp>
@@ -3072,7 +3094,12 @@
             <p:ph type="subTitle" idx="1"/>
           </p:nvPr>
         </p:nvSpPr>
-        <p:spPr/>
+        <p:spPr>
+          <a:xfrm>
+            <a:off x="1371600" y="2590800"/>
+            <a:ext cx="6400800" cy="1752600"/>
+          </a:xfrm>
+        </p:spPr>
         <p:txBody>
           <a:bodyPr>
             <a:normAutofit fontScale="85000" lnSpcReduction="10000"/>
@@ -3100,6 +3127,13 @@
   <p:clrMapOvr>
     <a:masterClrMapping/>
   </p:clrMapOvr>
+  <p:timing>
+    <p:tnLst>
+      <p:par>
+        <p:cTn id="1" dur="indefinite" restart="never" nodeType="tmRoot"/>
+      </p:par>
+    </p:tnLst>
+  </p:timing>
 </p:sld>
 </file>
 
@@ -3130,32 +3164,45 @@
             <p:ph type="title"/>
           </p:nvPr>
         </p:nvSpPr>
-        <p:spPr/>
-        <p:txBody>
-          <a:bodyPr/>
-          <a:lstStyle/>
-          <a:p>
-            <a:r>
-              <a:rPr lang="es-MX" dirty="0" smtClean="0"/>
-              <a:t>Hipótesis de problema</a:t>
-            </a:r>
-            <a:endParaRPr lang="en-US" dirty="0"/>
-          </a:p>
-        </p:txBody>
-      </p:sp>
-      <p:sp>
-        <p:nvSpPr>
-          <p:cNvPr id="3" name="Content Placeholder 2"/>
-          <p:cNvSpPr>
-            <a:spLocks noGrp="1"/>
-          </p:cNvSpPr>
-          <p:nvPr>
-            <p:ph idx="1"/>
-          </p:nvPr>
-        </p:nvSpPr>
         <p:spPr>
           <a:xfrm>
-            <a:off x="457200" y="1600200"/>
+            <a:off x="457200" y="838200"/>
+            <a:ext cx="8229600" cy="1143000"/>
+          </a:xfrm>
+        </p:spPr>
+        <p:txBody>
+          <a:bodyPr/>
+          <a:lstStyle/>
+          <a:p>
+            <a:r>
+              <a:rPr lang="es-MX" dirty="0" smtClean="0">
+                <a:solidFill>
+                  <a:schemeClr val="bg1"/>
+                </a:solidFill>
+              </a:rPr>
+              <a:t>Hipótesis de problema</a:t>
+            </a:r>
+            <a:endParaRPr lang="en-US" dirty="0">
+              <a:solidFill>
+                <a:schemeClr val="bg1"/>
+              </a:solidFill>
+            </a:endParaRPr>
+          </a:p>
+        </p:txBody>
+      </p:sp>
+      <p:sp>
+        <p:nvSpPr>
+          <p:cNvPr id="3" name="Content Placeholder 2"/>
+          <p:cNvSpPr>
+            <a:spLocks noGrp="1"/>
+          </p:cNvSpPr>
+          <p:nvPr>
+            <p:ph idx="1"/>
+          </p:nvPr>
+        </p:nvSpPr>
+        <p:spPr>
+          <a:xfrm>
+            <a:off x="304800" y="2514600"/>
             <a:ext cx="8229600" cy="2819400"/>
           </a:xfrm>
         </p:spPr>
@@ -3166,20 +3213,36 @@
           <a:lstStyle/>
           <a:p>
             <a:r>
-              <a:rPr lang="es-MX" dirty="0" smtClean="0"/>
+              <a:rPr lang="es-MX" dirty="0" smtClean="0">
+                <a:solidFill>
+                  <a:schemeClr val="bg1"/>
+                </a:solidFill>
+              </a:rPr>
               <a:t>Se puede hacer un análisis de sentimiento con la información dada y obtener una precisión que sea aceptable?</a:t>
             </a:r>
           </a:p>
           <a:p>
             <a:r>
-              <a:rPr lang="es-MX" dirty="0" smtClean="0"/>
+              <a:rPr lang="es-MX" dirty="0" smtClean="0">
+                <a:solidFill>
+                  <a:schemeClr val="bg1"/>
+                </a:solidFill>
+              </a:rPr>
               <a:t>Con este análisis poder determinar si los compradores están satisfechos con los teléfonos celulares en </a:t>
             </a:r>
             <a:r>
-              <a:rPr lang="es-MX" dirty="0" err="1" smtClean="0"/>
+              <a:rPr lang="es-MX" dirty="0" err="1" smtClean="0">
+                <a:solidFill>
+                  <a:schemeClr val="bg1"/>
+                </a:solidFill>
+              </a:rPr>
               <a:t>amazon</a:t>
             </a:r>
-            <a:endParaRPr lang="es-MX" dirty="0" smtClean="0"/>
+            <a:endParaRPr lang="es-MX" dirty="0" smtClean="0">
+              <a:solidFill>
+                <a:schemeClr val="bg1"/>
+              </a:solidFill>
+            </a:endParaRPr>
           </a:p>
           <a:p>
             <a:endParaRPr lang="en-US" dirty="0"/>
@@ -3191,6 +3254,13 @@
   <p:clrMapOvr>
     <a:masterClrMapping/>
   </p:clrMapOvr>
+  <p:timing>
+    <p:tnLst>
+      <p:par>
+        <p:cTn id="1" dur="indefinite" restart="never" nodeType="tmRoot"/>
+      </p:par>
+    </p:tnLst>
+  </p:timing>
 </p:sld>
 </file>
 
@@ -3304,7 +3374,12 @@
             <p:ph type="title"/>
           </p:nvPr>
         </p:nvSpPr>
-        <p:spPr/>
+        <p:spPr>
+          <a:xfrm>
+            <a:off x="381000" y="722144"/>
+            <a:ext cx="8229600" cy="792162"/>
+          </a:xfrm>
+        </p:spPr>
         <p:txBody>
           <a:bodyPr>
             <a:normAutofit/>
@@ -3312,10 +3387,18 @@
           <a:lstStyle/>
           <a:p>
             <a:r>
-              <a:rPr lang="es-MX" sz="3200" dirty="0" smtClean="0"/>
+              <a:rPr lang="es-MX" sz="3200" dirty="0" smtClean="0">
+                <a:solidFill>
+                  <a:schemeClr val="bg1"/>
+                </a:solidFill>
+              </a:rPr>
               <a:t>Exploración de datos</a:t>
             </a:r>
-            <a:endParaRPr lang="en-US" sz="3200" dirty="0"/>
+            <a:endParaRPr lang="en-US" sz="3200" dirty="0">
+              <a:solidFill>
+                <a:schemeClr val="bg1"/>
+              </a:solidFill>
+            </a:endParaRPr>
           </a:p>
         </p:txBody>
       </p:sp>
@@ -3338,7 +3421,7 @@
         </p:blipFill>
         <p:spPr bwMode="auto">
           <a:xfrm>
-            <a:off x="606088" y="4495800"/>
+            <a:off x="606088" y="4830268"/>
             <a:ext cx="7461740" cy="1951532"/>
           </a:xfrm>
           <a:prstGeom prst="rect">
@@ -3370,7 +3453,7 @@
         </p:blipFill>
         <p:spPr bwMode="auto">
           <a:xfrm>
-            <a:off x="606088" y="1066800"/>
+            <a:off x="606088" y="1401268"/>
             <a:ext cx="7848600" cy="1600532"/>
           </a:xfrm>
           <a:prstGeom prst="rect">
@@ -3393,7 +3476,7 @@
         </p:nvSpPr>
         <p:spPr>
           <a:xfrm>
-            <a:off x="606088" y="2842902"/>
+            <a:off x="606088" y="3177370"/>
             <a:ext cx="7315200" cy="1477328"/>
           </a:xfrm>
           <a:prstGeom prst="rect">
@@ -3408,11 +3491,19 @@
           <a:lstStyle/>
           <a:p>
             <a:r>
-              <a:rPr lang="es-MX" dirty="0" err="1" smtClean="0"/>
+              <a:rPr lang="es-MX" dirty="0" err="1" smtClean="0">
+                <a:solidFill>
+                  <a:schemeClr val="bg1"/>
+                </a:solidFill>
+              </a:rPr>
               <a:t>Features</a:t>
             </a:r>
             <a:r>
-              <a:rPr lang="es-MX" dirty="0" smtClean="0"/>
+              <a:rPr lang="es-MX" dirty="0" smtClean="0">
+                <a:solidFill>
+                  <a:schemeClr val="bg1"/>
+                </a:solidFill>
+              </a:rPr>
               <a:t> relevantes:</a:t>
             </a:r>
           </a:p>
@@ -3422,15 +3513,27 @@
               <a:buChar char="•"/>
             </a:pPr>
             <a:r>
-              <a:rPr lang="es-MX" dirty="0" smtClean="0"/>
+              <a:rPr lang="es-MX" dirty="0" smtClean="0">
+                <a:solidFill>
+                  <a:schemeClr val="bg1"/>
+                </a:solidFill>
+              </a:rPr>
               <a:t> </a:t>
             </a:r>
             <a:r>
-              <a:rPr lang="es-MX" dirty="0" err="1" smtClean="0"/>
+              <a:rPr lang="es-MX" dirty="0" err="1" smtClean="0">
+                <a:solidFill>
+                  <a:schemeClr val="bg1"/>
+                </a:solidFill>
+              </a:rPr>
               <a:t>asin</a:t>
             </a:r>
             <a:r>
-              <a:rPr lang="es-MX" dirty="0" smtClean="0"/>
+              <a:rPr lang="es-MX" dirty="0" smtClean="0">
+                <a:solidFill>
+                  <a:schemeClr val="bg1"/>
+                </a:solidFill>
+              </a:rPr>
               <a:t>, identificador del equipo celular</a:t>
             </a:r>
           </a:p>
@@ -3440,11 +3543,19 @@
               <a:buChar char="•"/>
             </a:pPr>
             <a:r>
-              <a:rPr lang="es-MX" dirty="0" err="1" smtClean="0"/>
+              <a:rPr lang="es-MX" dirty="0" err="1" smtClean="0">
+                <a:solidFill>
+                  <a:schemeClr val="bg1"/>
+                </a:solidFill>
+              </a:rPr>
               <a:t>Title</a:t>
             </a:r>
             <a:r>
-              <a:rPr lang="es-MX" dirty="0" smtClean="0"/>
+              <a:rPr lang="es-MX" dirty="0" smtClean="0">
+                <a:solidFill>
+                  <a:schemeClr val="bg1"/>
+                </a:solidFill>
+              </a:rPr>
               <a:t>, el titulo de la reseña *</a:t>
             </a:r>
           </a:p>
@@ -3454,11 +3565,19 @@
               <a:buChar char="•"/>
             </a:pPr>
             <a:r>
-              <a:rPr lang="es-MX" dirty="0" err="1" smtClean="0"/>
+              <a:rPr lang="es-MX" dirty="0" err="1" smtClean="0">
+                <a:solidFill>
+                  <a:schemeClr val="bg1"/>
+                </a:solidFill>
+              </a:rPr>
               <a:t>Body</a:t>
             </a:r>
             <a:r>
-              <a:rPr lang="es-MX" dirty="0" smtClean="0"/>
+              <a:rPr lang="es-MX" dirty="0" smtClean="0">
+                <a:solidFill>
+                  <a:schemeClr val="bg1"/>
+                </a:solidFill>
+              </a:rPr>
               <a:t>,  el contenido de la reseña</a:t>
             </a:r>
           </a:p>
@@ -3468,8 +3587,16 @@
               <a:buChar char="•"/>
             </a:pPr>
             <a:r>
+              <a:rPr lang="es-MX" dirty="0" smtClean="0">
+                <a:solidFill>
+                  <a:schemeClr val="bg1"/>
+                </a:solidFill>
+              </a:rPr>
+              <a:t>Rating, calificación  dada al equipo </a:t>
+            </a:r>
+            <a:r>
               <a:rPr lang="es-MX" dirty="0" smtClean="0"/>
-              <a:t>Rating, calificación  dada al equipo celular de 1 a 5</a:t>
+              <a:t>celular de 1 a 5</a:t>
             </a:r>
             <a:endParaRPr lang="en-US" dirty="0"/>
           </a:p>
@@ -3480,6 +3607,13 @@
   <p:clrMapOvr>
     <a:masterClrMapping/>
   </p:clrMapOvr>
+  <p:timing>
+    <p:tnLst>
+      <p:par>
+        <p:cTn id="1" dur="indefinite" restart="never" nodeType="tmRoot"/>
+      </p:par>
+    </p:tnLst>
+  </p:timing>
 </p:sld>
 </file>
 
@@ -3510,12 +3644,31 @@
             <p:ph type="ctrTitle"/>
           </p:nvPr>
         </p:nvSpPr>
-        <p:spPr/>
-        <p:txBody>
-          <a:bodyPr/>
-          <a:lstStyle/>
-          <a:p>
-            <a:endParaRPr lang="en-US"/>
+        <p:spPr>
+          <a:xfrm>
+            <a:off x="228600" y="914400"/>
+            <a:ext cx="6248400" cy="688975"/>
+          </a:xfrm>
+        </p:spPr>
+        <p:txBody>
+          <a:bodyPr>
+            <a:normAutofit/>
+          </a:bodyPr>
+          <a:lstStyle/>
+          <a:p>
+            <a:r>
+              <a:rPr lang="es-MX" sz="3000" dirty="0" smtClean="0">
+                <a:solidFill>
+                  <a:schemeClr val="bg1"/>
+                </a:solidFill>
+              </a:rPr>
+              <a:t>Lectura y transformación de los datos</a:t>
+            </a:r>
+            <a:endParaRPr lang="en-US" sz="3000" dirty="0">
+              <a:solidFill>
+                <a:schemeClr val="bg1"/>
+              </a:solidFill>
+            </a:endParaRPr>
           </a:p>
         </p:txBody>
       </p:sp>
@@ -3534,7 +3687,7 @@
           <a:bodyPr/>
           <a:lstStyle/>
           <a:p>
-            <a:endParaRPr lang="en-US"/>
+            <a:endParaRPr lang="en-US" dirty="0"/>
           </a:p>
         </p:txBody>
       </p:sp>
@@ -3543,6 +3696,13 @@
   <p:clrMapOvr>
     <a:masterClrMapping/>
   </p:clrMapOvr>
+  <p:timing>
+    <p:tnLst>
+      <p:par>
+        <p:cTn id="1" dur="indefinite" restart="never" nodeType="tmRoot"/>
+      </p:par>
+    </p:tnLst>
+  </p:timing>
 </p:sld>
 </file>
 

</xml_diff>

<commit_message>
release dec 21 2019
</commit_message>
<xml_diff>
--- a/NLP_reviews_cellphones.pptx
+++ b/NLP_reviews_cellphones.pptx
@@ -5,11 +5,20 @@
     <p:sldMasterId id="2147483648" r:id="rId1"/>
   </p:sldMasterIdLst>
   <p:sldIdLst>
-    <p:sldId id="256" r:id="rId2"/>
-    <p:sldId id="257" r:id="rId3"/>
-    <p:sldId id="258" r:id="rId4"/>
-    <p:sldId id="259" r:id="rId5"/>
-    <p:sldId id="260" r:id="rId6"/>
+    <p:sldId id="265" r:id="rId2"/>
+    <p:sldId id="256" r:id="rId3"/>
+    <p:sldId id="257" r:id="rId4"/>
+    <p:sldId id="258" r:id="rId5"/>
+    <p:sldId id="259" r:id="rId6"/>
+    <p:sldId id="260" r:id="rId7"/>
+    <p:sldId id="261" r:id="rId8"/>
+    <p:sldId id="268" r:id="rId9"/>
+    <p:sldId id="262" r:id="rId10"/>
+    <p:sldId id="263" r:id="rId11"/>
+    <p:sldId id="267" r:id="rId12"/>
+    <p:sldId id="264" r:id="rId13"/>
+    <p:sldId id="266" r:id="rId14"/>
+    <p:sldId id="269" r:id="rId15"/>
   </p:sldIdLst>
   <p:sldSz cx="9144000" cy="6858000" type="screen4x3"/>
   <p:notesSz cx="6858000" cy="9144000"/>
@@ -3034,6 +3043,14 @@
 <file path=ppt/slides/slide1.xml><?xml version="1.0" encoding="utf-8"?>
 <p:sld xmlns:a="http://schemas.openxmlformats.org/drawingml/2006/main" xmlns:r="http://schemas.openxmlformats.org/officeDocument/2006/relationships" xmlns:p="http://schemas.openxmlformats.org/presentationml/2006/main">
   <p:cSld>
+    <p:bg>
+      <p:bgPr>
+        <a:solidFill>
+          <a:schemeClr val="bg1"/>
+        </a:solidFill>
+        <a:effectLst/>
+      </p:bgPr>
+    </p:bg>
     <p:spTree>
       <p:nvGrpSpPr>
         <p:cNvPr id="1" name=""/>
@@ -3055,70 +3072,133 @@
             <a:spLocks noGrp="1"/>
           </p:cNvSpPr>
           <p:nvPr>
-            <p:ph type="ctrTitle"/>
+            <p:ph type="title"/>
           </p:nvPr>
         </p:nvSpPr>
         <p:spPr>
           <a:xfrm>
-            <a:off x="762000" y="838200"/>
-            <a:ext cx="7772400" cy="1470025"/>
-          </a:xfrm>
-        </p:spPr>
-        <p:txBody>
-          <a:bodyPr/>
+            <a:off x="533400" y="2514600"/>
+            <a:ext cx="8077200" cy="1752600"/>
+          </a:xfrm>
+        </p:spPr>
+        <p:txBody>
+          <a:bodyPr>
+            <a:normAutofit fontScale="90000"/>
+          </a:bodyPr>
+          <a:lstStyle/>
+          <a:p>
+            <a:r>
+              <a:rPr lang="es-MX" b="1" i="1" dirty="0" smtClean="0"/>
+              <a:t>Análisis de sentimiento de reseñas de usuarios en Amazon</a:t>
+            </a:r>
+            <a:br>
+              <a:rPr lang="es-MX" b="1" i="1" dirty="0" smtClean="0"/>
+            </a:br>
+            <a:r>
+              <a:rPr lang="es-MX" b="1" i="1" dirty="0" smtClean="0"/>
+              <a:t>con NPL</a:t>
+            </a:r>
+            <a:endParaRPr lang="en-US" b="1" i="1" dirty="0"/>
+          </a:p>
+        </p:txBody>
+      </p:sp>
+      <p:pic>
+        <p:nvPicPr>
+          <p:cNvPr id="22532" name="Picture 4" descr="Image result for natural language processing word cloud"/>
+          <p:cNvPicPr>
+            <a:picLocks noChangeAspect="1" noChangeArrowheads="1"/>
+          </p:cNvPicPr>
+          <p:nvPr/>
+        </p:nvPicPr>
+        <p:blipFill>
+          <a:blip r:embed="rId2" cstate="print"/>
+          <a:srcRect/>
+          <a:stretch>
+            <a:fillRect/>
+          </a:stretch>
+        </p:blipFill>
+        <p:spPr bwMode="auto">
+          <a:xfrm>
+            <a:off x="3124200" y="4495800"/>
+            <a:ext cx="2857500" cy="1809751"/>
+          </a:xfrm>
+          <a:prstGeom prst="rect">
+            <a:avLst/>
+          </a:prstGeom>
+          <a:noFill/>
+        </p:spPr>
+      </p:pic>
+      <p:pic>
+        <p:nvPicPr>
+          <p:cNvPr id="22535" name="Picture 7"/>
+          <p:cNvPicPr>
+            <a:picLocks noChangeAspect="1" noChangeArrowheads="1"/>
+          </p:cNvPicPr>
+          <p:nvPr/>
+        </p:nvPicPr>
+        <p:blipFill>
+          <a:blip r:embed="rId3" cstate="print"/>
+          <a:srcRect/>
+          <a:stretch>
+            <a:fillRect/>
+          </a:stretch>
+        </p:blipFill>
+        <p:spPr bwMode="auto">
+          <a:xfrm>
+            <a:off x="2667000" y="533400"/>
+            <a:ext cx="3600450" cy="790575"/>
+          </a:xfrm>
+          <a:prstGeom prst="rect">
+            <a:avLst/>
+          </a:prstGeom>
+          <a:noFill/>
+          <a:ln w="9525">
+            <a:noFill/>
+            <a:miter lim="800000"/>
+            <a:headEnd/>
+            <a:tailEnd/>
+          </a:ln>
+        </p:spPr>
+      </p:pic>
+      <p:sp>
+        <p:nvSpPr>
+          <p:cNvPr id="8" name="TextBox 7"/>
+          <p:cNvSpPr txBox="1"/>
+          <p:nvPr/>
+        </p:nvSpPr>
+        <p:spPr>
+          <a:xfrm>
+            <a:off x="6781800" y="5525869"/>
+            <a:ext cx="2010487" cy="646331"/>
+          </a:xfrm>
+          <a:prstGeom prst="rect">
+            <a:avLst/>
+          </a:prstGeom>
+          <a:noFill/>
+        </p:spPr>
+        <p:txBody>
+          <a:bodyPr wrap="none" rtlCol="0">
+            <a:spAutoFit/>
+          </a:bodyPr>
           <a:lstStyle/>
           <a:p>
             <a:r>
               <a:rPr lang="es-MX" dirty="0" smtClean="0">
-                <a:solidFill>
-                  <a:schemeClr val="bg1"/>
-                </a:solidFill>
-              </a:rPr>
-              <a:t>Definición del problema</a:t>
+                <a:latin typeface="Arial Narrow" pitchFamily="34" charset="0"/>
+              </a:rPr>
+              <a:t>21 de diciembre 2019</a:t>
+            </a:r>
+          </a:p>
+          <a:p>
+            <a:r>
+              <a:rPr lang="es-MX" dirty="0" smtClean="0">
+                <a:latin typeface="Arial Narrow" pitchFamily="34" charset="0"/>
+              </a:rPr>
+              <a:t>Monterrey</a:t>
             </a:r>
             <a:endParaRPr lang="en-US" dirty="0">
-              <a:solidFill>
-                <a:schemeClr val="bg1"/>
-              </a:solidFill>
+              <a:latin typeface="Arial Narrow" pitchFamily="34" charset="0"/>
             </a:endParaRPr>
-          </a:p>
-        </p:txBody>
-      </p:sp>
-      <p:sp>
-        <p:nvSpPr>
-          <p:cNvPr id="3" name="Subtitle 2"/>
-          <p:cNvSpPr>
-            <a:spLocks noGrp="1"/>
-          </p:cNvSpPr>
-          <p:nvPr>
-            <p:ph type="subTitle" idx="1"/>
-          </p:nvPr>
-        </p:nvSpPr>
-        <p:spPr>
-          <a:xfrm>
-            <a:off x="1371600" y="2590800"/>
-            <a:ext cx="6400800" cy="1752600"/>
-          </a:xfrm>
-        </p:spPr>
-        <p:txBody>
-          <a:bodyPr>
-            <a:normAutofit fontScale="85000" lnSpcReduction="10000"/>
-          </a:bodyPr>
-          <a:lstStyle/>
-          <a:p>
-            <a:r>
-              <a:rPr lang="es-MX" dirty="0" smtClean="0"/>
-              <a:t>Tener una medición de la satisfacción de los compradores por medio de sus reseñas; los datos con los que se cuentan son 2 </a:t>
-            </a:r>
-            <a:r>
-              <a:rPr lang="es-MX" dirty="0" err="1" smtClean="0"/>
-              <a:t>datasets</a:t>
-            </a:r>
-            <a:r>
-              <a:rPr lang="es-MX" dirty="0" smtClean="0"/>
-              <a:t>, catalogo de teléfonos y reseñas. </a:t>
-            </a:r>
-            <a:endParaRPr lang="en-US" dirty="0"/>
           </a:p>
         </p:txBody>
       </p:sp>
@@ -3134,6 +3214,921 @@
       </p:par>
     </p:tnLst>
   </p:timing>
+</p:sld>
+</file>
+
+<file path=ppt/slides/slide10.xml><?xml version="1.0" encoding="utf-8"?>
+<p:sld xmlns:a="http://schemas.openxmlformats.org/drawingml/2006/main" xmlns:r="http://schemas.openxmlformats.org/officeDocument/2006/relationships" xmlns:p="http://schemas.openxmlformats.org/presentationml/2006/main">
+  <p:cSld>
+    <p:spTree>
+      <p:nvGrpSpPr>
+        <p:cNvPr id="1" name=""/>
+        <p:cNvGrpSpPr/>
+        <p:nvPr/>
+      </p:nvGrpSpPr>
+      <p:grpSpPr>
+        <a:xfrm>
+          <a:off x="0" y="0"/>
+          <a:ext cx="0" cy="0"/>
+          <a:chOff x="0" y="0"/>
+          <a:chExt cx="0" cy="0"/>
+        </a:xfrm>
+      </p:grpSpPr>
+      <p:sp>
+        <p:nvSpPr>
+          <p:cNvPr id="2" name="Title 1"/>
+          <p:cNvSpPr>
+            <a:spLocks noGrp="1"/>
+          </p:cNvSpPr>
+          <p:nvPr>
+            <p:ph type="title"/>
+          </p:nvPr>
+        </p:nvSpPr>
+        <p:spPr>
+          <a:xfrm>
+            <a:off x="533400" y="762000"/>
+            <a:ext cx="8229600" cy="715962"/>
+          </a:xfrm>
+        </p:spPr>
+        <p:txBody>
+          <a:bodyPr>
+            <a:normAutofit/>
+          </a:bodyPr>
+          <a:lstStyle/>
+          <a:p>
+            <a:r>
+              <a:rPr lang="es-MX" sz="3200" dirty="0" smtClean="0">
+                <a:solidFill>
+                  <a:schemeClr val="bg2"/>
+                </a:solidFill>
+              </a:rPr>
+              <a:t>Comparación con matriz de confusión</a:t>
+            </a:r>
+            <a:endParaRPr lang="en-US" sz="3200" dirty="0">
+              <a:solidFill>
+                <a:schemeClr val="bg2"/>
+              </a:solidFill>
+            </a:endParaRPr>
+          </a:p>
+        </p:txBody>
+      </p:sp>
+      <p:pic>
+        <p:nvPicPr>
+          <p:cNvPr id="20482" name="Picture 2"/>
+          <p:cNvPicPr>
+            <a:picLocks noChangeAspect="1" noChangeArrowheads="1"/>
+          </p:cNvPicPr>
+          <p:nvPr/>
+        </p:nvPicPr>
+        <p:blipFill>
+          <a:blip r:embed="rId2" cstate="print"/>
+          <a:srcRect/>
+          <a:stretch>
+            <a:fillRect/>
+          </a:stretch>
+        </p:blipFill>
+        <p:spPr bwMode="auto">
+          <a:xfrm>
+            <a:off x="304800" y="2667000"/>
+            <a:ext cx="3581400" cy="3291840"/>
+          </a:xfrm>
+          <a:prstGeom prst="rect">
+            <a:avLst/>
+          </a:prstGeom>
+          <a:noFill/>
+          <a:ln w="9525">
+            <a:noFill/>
+            <a:miter lim="800000"/>
+            <a:headEnd/>
+            <a:tailEnd/>
+          </a:ln>
+        </p:spPr>
+      </p:pic>
+      <p:pic>
+        <p:nvPicPr>
+          <p:cNvPr id="20483" name="Picture 3"/>
+          <p:cNvPicPr>
+            <a:picLocks noChangeAspect="1" noChangeArrowheads="1"/>
+          </p:cNvPicPr>
+          <p:nvPr/>
+        </p:nvPicPr>
+        <p:blipFill>
+          <a:blip r:embed="rId3" cstate="print"/>
+          <a:srcRect/>
+          <a:stretch>
+            <a:fillRect/>
+          </a:stretch>
+        </p:blipFill>
+        <p:spPr bwMode="auto">
+          <a:xfrm>
+            <a:off x="5318760" y="2667000"/>
+            <a:ext cx="3581400" cy="3291840"/>
+          </a:xfrm>
+          <a:prstGeom prst="rect">
+            <a:avLst/>
+          </a:prstGeom>
+          <a:noFill/>
+          <a:ln w="9525">
+            <a:noFill/>
+            <a:miter lim="800000"/>
+            <a:headEnd/>
+            <a:tailEnd/>
+          </a:ln>
+        </p:spPr>
+      </p:pic>
+      <p:sp>
+        <p:nvSpPr>
+          <p:cNvPr id="6" name="TextBox 5"/>
+          <p:cNvSpPr txBox="1"/>
+          <p:nvPr/>
+        </p:nvSpPr>
+        <p:spPr>
+          <a:xfrm>
+            <a:off x="381000" y="2057400"/>
+            <a:ext cx="2971800" cy="461665"/>
+          </a:xfrm>
+          <a:prstGeom prst="rect">
+            <a:avLst/>
+          </a:prstGeom>
+          <a:noFill/>
+        </p:spPr>
+        <p:txBody>
+          <a:bodyPr wrap="square" rtlCol="0">
+            <a:spAutoFit/>
+          </a:bodyPr>
+          <a:lstStyle/>
+          <a:p>
+            <a:r>
+              <a:rPr lang="es-MX" sz="2400" dirty="0" err="1" smtClean="0">
+                <a:solidFill>
+                  <a:schemeClr val="bg2"/>
+                </a:solidFill>
+              </a:rPr>
+              <a:t>Unocero</a:t>
+            </a:r>
+            <a:r>
+              <a:rPr lang="es-MX" sz="2400" dirty="0" smtClean="0">
+                <a:solidFill>
+                  <a:schemeClr val="bg2"/>
+                </a:solidFill>
+              </a:rPr>
+              <a:t> </a:t>
+            </a:r>
+            <a:r>
+              <a:rPr lang="es-MX" sz="2400" dirty="0" err="1" smtClean="0">
+                <a:solidFill>
+                  <a:schemeClr val="bg2"/>
+                </a:solidFill>
+              </a:rPr>
+              <a:t>classifier</a:t>
+            </a:r>
+            <a:endParaRPr lang="en-US" sz="2400" dirty="0">
+              <a:solidFill>
+                <a:schemeClr val="bg2"/>
+              </a:solidFill>
+            </a:endParaRPr>
+          </a:p>
+        </p:txBody>
+      </p:sp>
+      <p:sp>
+        <p:nvSpPr>
+          <p:cNvPr id="7" name="TextBox 6"/>
+          <p:cNvSpPr txBox="1"/>
+          <p:nvPr/>
+        </p:nvSpPr>
+        <p:spPr>
+          <a:xfrm>
+            <a:off x="5318760" y="2057400"/>
+            <a:ext cx="2971800" cy="461665"/>
+          </a:xfrm>
+          <a:prstGeom prst="rect">
+            <a:avLst/>
+          </a:prstGeom>
+          <a:noFill/>
+        </p:spPr>
+        <p:txBody>
+          <a:bodyPr wrap="square" rtlCol="0">
+            <a:spAutoFit/>
+          </a:bodyPr>
+          <a:lstStyle/>
+          <a:p>
+            <a:r>
+              <a:rPr lang="es-MX" sz="2400" dirty="0" err="1" smtClean="0">
+                <a:solidFill>
+                  <a:schemeClr val="bg2"/>
+                </a:solidFill>
+              </a:rPr>
+              <a:t>Naive</a:t>
+            </a:r>
+            <a:r>
+              <a:rPr lang="es-MX" sz="2400" dirty="0" smtClean="0">
+                <a:solidFill>
+                  <a:schemeClr val="bg2"/>
+                </a:solidFill>
+              </a:rPr>
+              <a:t> </a:t>
+            </a:r>
+            <a:r>
+              <a:rPr lang="es-MX" sz="2400" dirty="0" err="1" smtClean="0">
+                <a:solidFill>
+                  <a:schemeClr val="bg2"/>
+                </a:solidFill>
+              </a:rPr>
+              <a:t>Bayes</a:t>
+            </a:r>
+            <a:r>
+              <a:rPr lang="es-MX" sz="2400" dirty="0" smtClean="0">
+                <a:solidFill>
+                  <a:schemeClr val="bg2"/>
+                </a:solidFill>
+              </a:rPr>
+              <a:t> </a:t>
+            </a:r>
+            <a:r>
+              <a:rPr lang="es-MX" sz="2400" dirty="0" err="1" smtClean="0">
+                <a:solidFill>
+                  <a:schemeClr val="bg2"/>
+                </a:solidFill>
+              </a:rPr>
+              <a:t>classifier</a:t>
+            </a:r>
+            <a:endParaRPr lang="en-US" sz="2400" dirty="0">
+              <a:solidFill>
+                <a:schemeClr val="bg2"/>
+              </a:solidFill>
+            </a:endParaRPr>
+          </a:p>
+        </p:txBody>
+      </p:sp>
+    </p:spTree>
+  </p:cSld>
+  <p:clrMapOvr>
+    <a:masterClrMapping/>
+  </p:clrMapOvr>
+</p:sld>
+</file>
+
+<file path=ppt/slides/slide11.xml><?xml version="1.0" encoding="utf-8"?>
+<p:sld xmlns:a="http://schemas.openxmlformats.org/drawingml/2006/main" xmlns:r="http://schemas.openxmlformats.org/officeDocument/2006/relationships" xmlns:p="http://schemas.openxmlformats.org/presentationml/2006/main">
+  <p:cSld>
+    <p:spTree>
+      <p:nvGrpSpPr>
+        <p:cNvPr id="1" name=""/>
+        <p:cNvGrpSpPr/>
+        <p:nvPr/>
+      </p:nvGrpSpPr>
+      <p:grpSpPr>
+        <a:xfrm>
+          <a:off x="0" y="0"/>
+          <a:ext cx="0" cy="0"/>
+          <a:chOff x="0" y="0"/>
+          <a:chExt cx="0" cy="0"/>
+        </a:xfrm>
+      </p:grpSpPr>
+      <p:sp>
+        <p:nvSpPr>
+          <p:cNvPr id="2" name="Title 1"/>
+          <p:cNvSpPr>
+            <a:spLocks noGrp="1"/>
+          </p:cNvSpPr>
+          <p:nvPr>
+            <p:ph type="title"/>
+          </p:nvPr>
+        </p:nvSpPr>
+        <p:spPr>
+          <a:xfrm>
+            <a:off x="457200" y="909704"/>
+            <a:ext cx="8229600" cy="690496"/>
+          </a:xfrm>
+        </p:spPr>
+        <p:txBody>
+          <a:bodyPr>
+            <a:normAutofit/>
+          </a:bodyPr>
+          <a:lstStyle/>
+          <a:p>
+            <a:r>
+              <a:rPr lang="es-MX" sz="3200" dirty="0" smtClean="0">
+                <a:solidFill>
+                  <a:schemeClr val="bg1"/>
+                </a:solidFill>
+              </a:rPr>
+              <a:t>Curva </a:t>
+            </a:r>
+            <a:r>
+              <a:rPr lang="es-MX" sz="3200" dirty="0" err="1" smtClean="0">
+                <a:solidFill>
+                  <a:schemeClr val="bg1"/>
+                </a:solidFill>
+              </a:rPr>
+              <a:t>Roc</a:t>
+            </a:r>
+            <a:r>
+              <a:rPr lang="es-MX" sz="3200" dirty="0" smtClean="0">
+                <a:solidFill>
+                  <a:schemeClr val="bg1"/>
+                </a:solidFill>
+              </a:rPr>
+              <a:t> de modelo </a:t>
+            </a:r>
+            <a:r>
+              <a:rPr lang="es-MX" sz="3200" dirty="0" err="1" smtClean="0">
+                <a:solidFill>
+                  <a:schemeClr val="bg1"/>
+                </a:solidFill>
+              </a:rPr>
+              <a:t>Naive</a:t>
+            </a:r>
+            <a:r>
+              <a:rPr lang="es-MX" sz="3200" dirty="0" smtClean="0">
+                <a:solidFill>
+                  <a:schemeClr val="bg1"/>
+                </a:solidFill>
+              </a:rPr>
+              <a:t> </a:t>
+            </a:r>
+            <a:r>
+              <a:rPr lang="es-MX" sz="3200" dirty="0" err="1" smtClean="0">
+                <a:solidFill>
+                  <a:schemeClr val="bg1"/>
+                </a:solidFill>
+              </a:rPr>
+              <a:t>Bayes</a:t>
+            </a:r>
+            <a:endParaRPr lang="en-US" sz="3200" dirty="0">
+              <a:solidFill>
+                <a:schemeClr val="bg1"/>
+              </a:solidFill>
+            </a:endParaRPr>
+          </a:p>
+        </p:txBody>
+      </p:sp>
+      <p:pic>
+        <p:nvPicPr>
+          <p:cNvPr id="23555" name="Picture 3"/>
+          <p:cNvPicPr>
+            <a:picLocks noChangeAspect="1" noChangeArrowheads="1"/>
+          </p:cNvPicPr>
+          <p:nvPr/>
+        </p:nvPicPr>
+        <p:blipFill>
+          <a:blip r:embed="rId2" cstate="print"/>
+          <a:srcRect/>
+          <a:stretch>
+            <a:fillRect/>
+          </a:stretch>
+        </p:blipFill>
+        <p:spPr bwMode="auto">
+          <a:xfrm>
+            <a:off x="838200" y="2286000"/>
+            <a:ext cx="3276600" cy="3352800"/>
+          </a:xfrm>
+          <a:prstGeom prst="rect">
+            <a:avLst/>
+          </a:prstGeom>
+          <a:noFill/>
+          <a:ln w="9525">
+            <a:noFill/>
+            <a:miter lim="800000"/>
+            <a:headEnd/>
+            <a:tailEnd/>
+          </a:ln>
+        </p:spPr>
+      </p:pic>
+      <p:pic>
+        <p:nvPicPr>
+          <p:cNvPr id="23558" name="Picture 6"/>
+          <p:cNvPicPr>
+            <a:picLocks noChangeAspect="1" noChangeArrowheads="1"/>
+          </p:cNvPicPr>
+          <p:nvPr/>
+        </p:nvPicPr>
+        <p:blipFill>
+          <a:blip r:embed="rId3" cstate="print"/>
+          <a:srcRect/>
+          <a:stretch>
+            <a:fillRect/>
+          </a:stretch>
+        </p:blipFill>
+        <p:spPr bwMode="auto">
+          <a:xfrm>
+            <a:off x="5086350" y="2286000"/>
+            <a:ext cx="3371850" cy="3352800"/>
+          </a:xfrm>
+          <a:prstGeom prst="rect">
+            <a:avLst/>
+          </a:prstGeom>
+          <a:noFill/>
+          <a:ln w="9525">
+            <a:noFill/>
+            <a:miter lim="800000"/>
+            <a:headEnd/>
+            <a:tailEnd/>
+          </a:ln>
+        </p:spPr>
+      </p:pic>
+    </p:spTree>
+  </p:cSld>
+  <p:clrMapOvr>
+    <a:masterClrMapping/>
+  </p:clrMapOvr>
+</p:sld>
+</file>
+
+<file path=ppt/slides/slide12.xml><?xml version="1.0" encoding="utf-8"?>
+<p:sld xmlns:a="http://schemas.openxmlformats.org/drawingml/2006/main" xmlns:r="http://schemas.openxmlformats.org/officeDocument/2006/relationships" xmlns:p="http://schemas.openxmlformats.org/presentationml/2006/main">
+  <p:cSld>
+    <p:spTree>
+      <p:nvGrpSpPr>
+        <p:cNvPr id="1" name=""/>
+        <p:cNvGrpSpPr/>
+        <p:nvPr/>
+      </p:nvGrpSpPr>
+      <p:grpSpPr>
+        <a:xfrm>
+          <a:off x="0" y="0"/>
+          <a:ext cx="0" cy="0"/>
+          <a:chOff x="0" y="0"/>
+          <a:chExt cx="0" cy="0"/>
+        </a:xfrm>
+      </p:grpSpPr>
+      <p:sp>
+        <p:nvSpPr>
+          <p:cNvPr id="2" name="Title 1"/>
+          <p:cNvSpPr>
+            <a:spLocks noGrp="1"/>
+          </p:cNvSpPr>
+          <p:nvPr>
+            <p:ph type="title"/>
+          </p:nvPr>
+        </p:nvSpPr>
+        <p:spPr>
+          <a:xfrm>
+            <a:off x="533400" y="914400"/>
+            <a:ext cx="8229600" cy="1325562"/>
+          </a:xfrm>
+        </p:spPr>
+        <p:txBody>
+          <a:bodyPr>
+            <a:normAutofit/>
+          </a:bodyPr>
+          <a:lstStyle/>
+          <a:p>
+            <a:r>
+              <a:rPr lang="es-MX" sz="3200" dirty="0" smtClean="0">
+                <a:solidFill>
+                  <a:schemeClr val="bg2"/>
+                </a:solidFill>
+              </a:rPr>
+              <a:t>Comparación clasificación del modelo vs datos de prueba</a:t>
+            </a:r>
+            <a:endParaRPr lang="en-US" sz="3200" dirty="0">
+              <a:solidFill>
+                <a:schemeClr val="bg2"/>
+              </a:solidFill>
+            </a:endParaRPr>
+          </a:p>
+        </p:txBody>
+      </p:sp>
+      <p:pic>
+        <p:nvPicPr>
+          <p:cNvPr id="21507" name="Picture 3"/>
+          <p:cNvPicPr>
+            <a:picLocks noChangeAspect="1" noChangeArrowheads="1"/>
+          </p:cNvPicPr>
+          <p:nvPr/>
+        </p:nvPicPr>
+        <p:blipFill>
+          <a:blip r:embed="rId2" cstate="print"/>
+          <a:srcRect/>
+          <a:stretch>
+            <a:fillRect/>
+          </a:stretch>
+        </p:blipFill>
+        <p:spPr bwMode="auto">
+          <a:xfrm>
+            <a:off x="457200" y="3876675"/>
+            <a:ext cx="3848100" cy="2600325"/>
+          </a:xfrm>
+          <a:prstGeom prst="rect">
+            <a:avLst/>
+          </a:prstGeom>
+          <a:noFill/>
+          <a:ln w="9525">
+            <a:noFill/>
+            <a:miter lim="800000"/>
+            <a:headEnd/>
+            <a:tailEnd/>
+          </a:ln>
+        </p:spPr>
+      </p:pic>
+      <p:pic>
+        <p:nvPicPr>
+          <p:cNvPr id="21508" name="Picture 4"/>
+          <p:cNvPicPr>
+            <a:picLocks noChangeAspect="1" noChangeArrowheads="1"/>
+          </p:cNvPicPr>
+          <p:nvPr/>
+        </p:nvPicPr>
+        <p:blipFill>
+          <a:blip r:embed="rId3" cstate="print"/>
+          <a:srcRect/>
+          <a:stretch>
+            <a:fillRect/>
+          </a:stretch>
+        </p:blipFill>
+        <p:spPr bwMode="auto">
+          <a:xfrm>
+            <a:off x="4657725" y="3895725"/>
+            <a:ext cx="3876675" cy="2562225"/>
+          </a:xfrm>
+          <a:prstGeom prst="rect">
+            <a:avLst/>
+          </a:prstGeom>
+          <a:noFill/>
+          <a:ln w="9525">
+            <a:noFill/>
+            <a:miter lim="800000"/>
+            <a:headEnd/>
+            <a:tailEnd/>
+          </a:ln>
+        </p:spPr>
+      </p:pic>
+      <p:sp>
+        <p:nvSpPr>
+          <p:cNvPr id="7" name="TextBox 6"/>
+          <p:cNvSpPr txBox="1"/>
+          <p:nvPr/>
+        </p:nvSpPr>
+        <p:spPr>
+          <a:xfrm>
+            <a:off x="457200" y="3048000"/>
+            <a:ext cx="2407903" cy="461665"/>
+          </a:xfrm>
+          <a:prstGeom prst="rect">
+            <a:avLst/>
+          </a:prstGeom>
+          <a:noFill/>
+        </p:spPr>
+        <p:txBody>
+          <a:bodyPr wrap="none" rtlCol="0">
+            <a:spAutoFit/>
+          </a:bodyPr>
+          <a:lstStyle/>
+          <a:p>
+            <a:r>
+              <a:rPr lang="es-MX" sz="2400" dirty="0" err="1" smtClean="0">
+                <a:solidFill>
+                  <a:schemeClr val="bg2"/>
+                </a:solidFill>
+              </a:rPr>
+              <a:t>Unocero</a:t>
+            </a:r>
+            <a:r>
+              <a:rPr lang="es-MX" sz="2400" dirty="0" smtClean="0">
+                <a:solidFill>
+                  <a:schemeClr val="bg2"/>
+                </a:solidFill>
+              </a:rPr>
+              <a:t> </a:t>
+            </a:r>
+            <a:r>
+              <a:rPr lang="es-MX" sz="2400" dirty="0" err="1" smtClean="0">
+                <a:solidFill>
+                  <a:schemeClr val="bg2"/>
+                </a:solidFill>
+              </a:rPr>
+              <a:t>classifier</a:t>
+            </a:r>
+            <a:endParaRPr lang="en-US" sz="2400" dirty="0">
+              <a:solidFill>
+                <a:schemeClr val="bg2"/>
+              </a:solidFill>
+            </a:endParaRPr>
+          </a:p>
+        </p:txBody>
+      </p:sp>
+      <p:sp>
+        <p:nvSpPr>
+          <p:cNvPr id="8" name="TextBox 7"/>
+          <p:cNvSpPr txBox="1"/>
+          <p:nvPr/>
+        </p:nvSpPr>
+        <p:spPr>
+          <a:xfrm>
+            <a:off x="4657725" y="3048000"/>
+            <a:ext cx="2265172" cy="461665"/>
+          </a:xfrm>
+          <a:prstGeom prst="rect">
+            <a:avLst/>
+          </a:prstGeom>
+          <a:noFill/>
+        </p:spPr>
+        <p:txBody>
+          <a:bodyPr wrap="none" rtlCol="0">
+            <a:spAutoFit/>
+          </a:bodyPr>
+          <a:lstStyle/>
+          <a:p>
+            <a:r>
+              <a:rPr lang="es-MX" sz="2400" dirty="0" smtClean="0">
+                <a:solidFill>
+                  <a:schemeClr val="bg2"/>
+                </a:solidFill>
+              </a:rPr>
+              <a:t>Clasificación real</a:t>
+            </a:r>
+            <a:endParaRPr lang="en-US" sz="2400" dirty="0">
+              <a:solidFill>
+                <a:schemeClr val="bg2"/>
+              </a:solidFill>
+            </a:endParaRPr>
+          </a:p>
+        </p:txBody>
+      </p:sp>
+    </p:spTree>
+  </p:cSld>
+  <p:clrMapOvr>
+    <a:masterClrMapping/>
+  </p:clrMapOvr>
+</p:sld>
+</file>
+
+<file path=ppt/slides/slide13.xml><?xml version="1.0" encoding="utf-8"?>
+<p:sld xmlns:a="http://schemas.openxmlformats.org/drawingml/2006/main" xmlns:r="http://schemas.openxmlformats.org/officeDocument/2006/relationships" xmlns:p="http://schemas.openxmlformats.org/presentationml/2006/main">
+  <p:cSld>
+    <p:spTree>
+      <p:nvGrpSpPr>
+        <p:cNvPr id="1" name=""/>
+        <p:cNvGrpSpPr/>
+        <p:nvPr/>
+      </p:nvGrpSpPr>
+      <p:grpSpPr>
+        <a:xfrm>
+          <a:off x="0" y="0"/>
+          <a:ext cx="0" cy="0"/>
+          <a:chOff x="0" y="0"/>
+          <a:chExt cx="0" cy="0"/>
+        </a:xfrm>
+      </p:grpSpPr>
+      <p:sp>
+        <p:nvSpPr>
+          <p:cNvPr id="2" name="Title 1"/>
+          <p:cNvSpPr>
+            <a:spLocks noGrp="1"/>
+          </p:cNvSpPr>
+          <p:nvPr>
+            <p:ph type="title"/>
+          </p:nvPr>
+        </p:nvSpPr>
+        <p:spPr>
+          <a:xfrm>
+            <a:off x="457200" y="1447800"/>
+            <a:ext cx="8229600" cy="838200"/>
+          </a:xfrm>
+        </p:spPr>
+        <p:txBody>
+          <a:bodyPr/>
+          <a:lstStyle/>
+          <a:p>
+            <a:r>
+              <a:rPr lang="es-MX" dirty="0" smtClean="0">
+                <a:solidFill>
+                  <a:schemeClr val="bg1"/>
+                </a:solidFill>
+              </a:rPr>
+              <a:t>Trabajo a futuro</a:t>
+            </a:r>
+            <a:endParaRPr lang="en-US" dirty="0">
+              <a:solidFill>
+                <a:schemeClr val="bg1"/>
+              </a:solidFill>
+            </a:endParaRPr>
+          </a:p>
+        </p:txBody>
+      </p:sp>
+      <p:sp>
+        <p:nvSpPr>
+          <p:cNvPr id="3" name="Content Placeholder 2"/>
+          <p:cNvSpPr>
+            <a:spLocks noGrp="1"/>
+          </p:cNvSpPr>
+          <p:nvPr>
+            <p:ph idx="1"/>
+          </p:nvPr>
+        </p:nvSpPr>
+        <p:spPr>
+          <a:xfrm>
+            <a:off x="381000" y="2895600"/>
+            <a:ext cx="8229600" cy="3047999"/>
+          </a:xfrm>
+        </p:spPr>
+        <p:txBody>
+          <a:bodyPr>
+            <a:normAutofit/>
+          </a:bodyPr>
+          <a:lstStyle/>
+          <a:p>
+            <a:r>
+              <a:rPr lang="es-MX" sz="2400" dirty="0" smtClean="0">
+                <a:solidFill>
+                  <a:schemeClr val="bg1"/>
+                </a:solidFill>
+              </a:rPr>
+              <a:t>Obtener características de cada equipo celular</a:t>
+            </a:r>
+          </a:p>
+          <a:p>
+            <a:r>
+              <a:rPr lang="es-MX" sz="2400" dirty="0" smtClean="0">
+                <a:solidFill>
+                  <a:schemeClr val="bg1"/>
+                </a:solidFill>
+              </a:rPr>
+              <a:t>Tratar determinar con análisis de sentimiento que características son mas importantes</a:t>
+            </a:r>
+          </a:p>
+          <a:p>
+            <a:r>
+              <a:rPr lang="es-MX" sz="2400" dirty="0" smtClean="0">
+                <a:solidFill>
+                  <a:schemeClr val="bg1"/>
+                </a:solidFill>
+              </a:rPr>
+              <a:t>Replicar este trabajo para idioma español</a:t>
+            </a:r>
+          </a:p>
+          <a:p>
+            <a:r>
+              <a:rPr lang="es-MX" sz="2400" dirty="0" smtClean="0">
+                <a:solidFill>
+                  <a:schemeClr val="bg1"/>
+                </a:solidFill>
+              </a:rPr>
+              <a:t>Crear un catalogo de </a:t>
+            </a:r>
+            <a:r>
+              <a:rPr lang="es-MX" sz="2400" dirty="0" err="1" smtClean="0">
+                <a:solidFill>
+                  <a:schemeClr val="bg1"/>
+                </a:solidFill>
+              </a:rPr>
+              <a:t>stopwords</a:t>
+            </a:r>
+            <a:r>
+              <a:rPr lang="es-MX" sz="2400" dirty="0" smtClean="0">
+                <a:solidFill>
+                  <a:schemeClr val="bg1"/>
+                </a:solidFill>
+              </a:rPr>
+              <a:t> para español</a:t>
+            </a:r>
+          </a:p>
+          <a:p>
+            <a:r>
+              <a:rPr lang="es-MX" sz="2400" dirty="0" smtClean="0">
+                <a:solidFill>
+                  <a:schemeClr val="bg1"/>
+                </a:solidFill>
+              </a:rPr>
+              <a:t>Exponer mi modelo en español como servicio web</a:t>
+            </a:r>
+            <a:endParaRPr lang="en-US" sz="2400" dirty="0">
+              <a:solidFill>
+                <a:schemeClr val="bg1"/>
+              </a:solidFill>
+            </a:endParaRPr>
+          </a:p>
+        </p:txBody>
+      </p:sp>
+    </p:spTree>
+  </p:cSld>
+  <p:clrMapOvr>
+    <a:masterClrMapping/>
+  </p:clrMapOvr>
+</p:sld>
+</file>
+
+<file path=ppt/slides/slide14.xml><?xml version="1.0" encoding="utf-8"?>
+<p:sld xmlns:a="http://schemas.openxmlformats.org/drawingml/2006/main" xmlns:r="http://schemas.openxmlformats.org/officeDocument/2006/relationships" xmlns:p="http://schemas.openxmlformats.org/presentationml/2006/main">
+  <p:cSld>
+    <p:spTree>
+      <p:nvGrpSpPr>
+        <p:cNvPr id="1" name=""/>
+        <p:cNvGrpSpPr/>
+        <p:nvPr/>
+      </p:nvGrpSpPr>
+      <p:grpSpPr>
+        <a:xfrm>
+          <a:off x="0" y="0"/>
+          <a:ext cx="0" cy="0"/>
+          <a:chOff x="0" y="0"/>
+          <a:chExt cx="0" cy="0"/>
+        </a:xfrm>
+      </p:grpSpPr>
+      <p:sp>
+        <p:nvSpPr>
+          <p:cNvPr id="2" name="Title 1"/>
+          <p:cNvSpPr>
+            <a:spLocks noGrp="1"/>
+          </p:cNvSpPr>
+          <p:nvPr>
+            <p:ph type="title"/>
+          </p:nvPr>
+        </p:nvSpPr>
+        <p:spPr>
+          <a:xfrm>
+            <a:off x="457200" y="1524000"/>
+            <a:ext cx="8229600" cy="914400"/>
+          </a:xfrm>
+        </p:spPr>
+        <p:txBody>
+          <a:bodyPr/>
+          <a:lstStyle/>
+          <a:p>
+            <a:r>
+              <a:rPr lang="es-MX" i="1" dirty="0" smtClean="0">
+                <a:solidFill>
+                  <a:schemeClr val="bg1"/>
+                </a:solidFill>
+              </a:rPr>
+              <a:t>Hasta la próxima!!</a:t>
+            </a:r>
+            <a:endParaRPr lang="en-US" i="1" dirty="0">
+              <a:solidFill>
+                <a:schemeClr val="bg1"/>
+              </a:solidFill>
+            </a:endParaRPr>
+          </a:p>
+        </p:txBody>
+      </p:sp>
+      <p:sp>
+        <p:nvSpPr>
+          <p:cNvPr id="4" name="TextBox 3"/>
+          <p:cNvSpPr txBox="1"/>
+          <p:nvPr/>
+        </p:nvSpPr>
+        <p:spPr>
+          <a:xfrm>
+            <a:off x="381000" y="2971800"/>
+            <a:ext cx="8512267" cy="1077218"/>
+          </a:xfrm>
+          <a:prstGeom prst="rect">
+            <a:avLst/>
+          </a:prstGeom>
+          <a:noFill/>
+        </p:spPr>
+        <p:txBody>
+          <a:bodyPr wrap="none" rtlCol="0">
+            <a:spAutoFit/>
+          </a:bodyPr>
+          <a:lstStyle/>
+          <a:p>
+            <a:r>
+              <a:rPr lang="es-MX" sz="3200" dirty="0" err="1" smtClean="0">
+                <a:solidFill>
+                  <a:schemeClr val="bg1"/>
+                </a:solidFill>
+              </a:rPr>
+              <a:t>Github</a:t>
+            </a:r>
+            <a:r>
+              <a:rPr lang="es-MX" sz="3200" dirty="0" smtClean="0">
+                <a:solidFill>
+                  <a:schemeClr val="bg1"/>
+                </a:solidFill>
+              </a:rPr>
+              <a:t> de proyecto:</a:t>
+            </a:r>
+          </a:p>
+          <a:p>
+            <a:r>
+              <a:rPr lang="es-MX" sz="3200" dirty="0" smtClean="0">
+                <a:solidFill>
+                  <a:schemeClr val="bg1"/>
+                </a:solidFill>
+              </a:rPr>
+              <a:t> </a:t>
+            </a:r>
+            <a:r>
+              <a:rPr lang="en-US" sz="3200" dirty="0" smtClean="0">
+                <a:hlinkClick r:id="rId2"/>
+              </a:rPr>
+              <a:t>https://github.com/theRaffe/cerouno-project-npl</a:t>
+            </a:r>
+            <a:endParaRPr lang="en-US" sz="3200" dirty="0">
+              <a:solidFill>
+                <a:schemeClr val="bg1"/>
+              </a:solidFill>
+            </a:endParaRPr>
+          </a:p>
+        </p:txBody>
+      </p:sp>
+    </p:spTree>
+  </p:cSld>
+  <p:clrMapOvr>
+    <a:masterClrMapping/>
+  </p:clrMapOvr>
 </p:sld>
 </file>
 
@@ -3161,13 +4156,13 @@
             <a:spLocks noGrp="1"/>
           </p:cNvSpPr>
           <p:nvPr>
-            <p:ph type="title"/>
+            <p:ph type="ctrTitle"/>
           </p:nvPr>
         </p:nvSpPr>
         <p:spPr>
           <a:xfrm>
-            <a:off x="457200" y="838200"/>
-            <a:ext cx="8229600" cy="1143000"/>
+            <a:off x="762000" y="838200"/>
+            <a:ext cx="7772400" cy="1470025"/>
           </a:xfrm>
         </p:spPr>
         <p:txBody>
@@ -3180,7 +4175,7 @@
                   <a:schemeClr val="bg1"/>
                 </a:solidFill>
               </a:rPr>
-              <a:t>Hipótesis de problema</a:t>
+              <a:t>Definición del problema</a:t>
             </a:r>
             <a:endParaRPr lang="en-US" dirty="0">
               <a:solidFill>
@@ -3192,23 +4187,23 @@
       </p:sp>
       <p:sp>
         <p:nvSpPr>
-          <p:cNvPr id="3" name="Content Placeholder 2"/>
-          <p:cNvSpPr>
-            <a:spLocks noGrp="1"/>
-          </p:cNvSpPr>
-          <p:nvPr>
-            <p:ph idx="1"/>
+          <p:cNvPr id="3" name="Subtitle 2"/>
+          <p:cNvSpPr>
+            <a:spLocks noGrp="1"/>
+          </p:cNvSpPr>
+          <p:nvPr>
+            <p:ph type="subTitle" idx="1"/>
           </p:nvPr>
         </p:nvSpPr>
         <p:spPr>
           <a:xfrm>
-            <a:off x="304800" y="2514600"/>
-            <a:ext cx="8229600" cy="2819400"/>
+            <a:off x="1371600" y="2590800"/>
+            <a:ext cx="6400800" cy="1752600"/>
           </a:xfrm>
         </p:spPr>
         <p:txBody>
           <a:bodyPr>
-            <a:normAutofit fontScale="92500" lnSpcReduction="10000"/>
+            <a:normAutofit fontScale="85000" lnSpcReduction="10000"/>
           </a:bodyPr>
           <a:lstStyle/>
           <a:p>
@@ -3218,34 +4213,29 @@
                   <a:schemeClr val="bg1"/>
                 </a:solidFill>
               </a:rPr>
-              <a:t>Se puede hacer un análisis de sentimiento con la información dada y obtener una precisión que sea aceptable?</a:t>
-            </a:r>
-          </a:p>
-          <a:p>
+              <a:t>Tener una medición de la satisfacción de los compradores por medio de sus reseñas; los datos con los que se cuentan son 2 </a:t>
+            </a:r>
+            <a:r>
+              <a:rPr lang="es-MX" dirty="0" err="1" smtClean="0">
+                <a:solidFill>
+                  <a:schemeClr val="bg1"/>
+                </a:solidFill>
+              </a:rPr>
+              <a:t>datasets</a:t>
+            </a:r>
             <a:r>
               <a:rPr lang="es-MX" dirty="0" smtClean="0">
                 <a:solidFill>
                   <a:schemeClr val="bg1"/>
                 </a:solidFill>
               </a:rPr>
-              <a:t>Con este análisis poder determinar si los compradores están satisfechos con los teléfonos celulares en </a:t>
-            </a:r>
-            <a:r>
-              <a:rPr lang="es-MX" dirty="0" err="1" smtClean="0">
-                <a:solidFill>
-                  <a:schemeClr val="bg1"/>
-                </a:solidFill>
-              </a:rPr>
-              <a:t>amazon</a:t>
-            </a:r>
-            <a:endParaRPr lang="es-MX" dirty="0" smtClean="0">
+              <a:t>, catalogo de teléfonos y reseñas. </a:t>
+            </a:r>
+            <a:endParaRPr lang="en-US" dirty="0">
               <a:solidFill>
                 <a:schemeClr val="bg1"/>
               </a:solidFill>
             </a:endParaRPr>
-          </a:p>
-          <a:p>
-            <a:endParaRPr lang="en-US" dirty="0"/>
           </a:p>
         </p:txBody>
       </p:sp>
@@ -3288,13 +4278,13 @@
             <a:spLocks noGrp="1"/>
           </p:cNvSpPr>
           <p:nvPr>
-            <p:ph type="ctrTitle"/>
+            <p:ph type="title"/>
           </p:nvPr>
         </p:nvSpPr>
         <p:spPr>
           <a:xfrm>
-            <a:off x="609600" y="685800"/>
-            <a:ext cx="7772400" cy="1470025"/>
+            <a:off x="457200" y="838200"/>
+            <a:ext cx="8229600" cy="1143000"/>
           </a:xfrm>
         </p:spPr>
         <p:txBody>
@@ -3302,39 +4292,76 @@
           <a:lstStyle/>
           <a:p>
             <a:r>
-              <a:rPr lang="es-MX" dirty="0" smtClean="0"/>
-              <a:t>Alcance </a:t>
-            </a:r>
-            <a:endParaRPr lang="en-US" dirty="0"/>
-          </a:p>
-        </p:txBody>
-      </p:sp>
-      <p:sp>
-        <p:nvSpPr>
-          <p:cNvPr id="3" name="Subtitle 2"/>
-          <p:cNvSpPr>
-            <a:spLocks noGrp="1"/>
-          </p:cNvSpPr>
-          <p:nvPr>
-            <p:ph type="subTitle" idx="1"/>
+              <a:rPr lang="es-MX" dirty="0" smtClean="0">
+                <a:solidFill>
+                  <a:schemeClr val="bg1"/>
+                </a:solidFill>
+              </a:rPr>
+              <a:t>Hipótesis de problema</a:t>
+            </a:r>
+            <a:endParaRPr lang="en-US" dirty="0">
+              <a:solidFill>
+                <a:schemeClr val="bg1"/>
+              </a:solidFill>
+            </a:endParaRPr>
+          </a:p>
+        </p:txBody>
+      </p:sp>
+      <p:sp>
+        <p:nvSpPr>
+          <p:cNvPr id="3" name="Content Placeholder 2"/>
+          <p:cNvSpPr>
+            <a:spLocks noGrp="1"/>
+          </p:cNvSpPr>
+          <p:nvPr>
+            <p:ph idx="1"/>
           </p:nvPr>
         </p:nvSpPr>
         <p:spPr>
           <a:xfrm>
-            <a:off x="1371600" y="1981200"/>
-            <a:ext cx="6400800" cy="2590800"/>
+            <a:off x="304800" y="2514600"/>
+            <a:ext cx="8229600" cy="2819400"/>
           </a:xfrm>
         </p:spPr>
         <p:txBody>
           <a:bodyPr>
-            <a:normAutofit/>
+            <a:normAutofit fontScale="92500" lnSpcReduction="10000"/>
           </a:bodyPr>
           <a:lstStyle/>
           <a:p>
             <a:r>
-              <a:rPr lang="es-MX" dirty="0" smtClean="0"/>
-              <a:t>Hacer un análisis de sentimiento con algunos de los algoritmos de clasificación y obtener al menos una precisión aceptable(0.7) y con esto determinar la satisfacción del cliente </a:t>
-            </a:r>
+              <a:rPr lang="es-MX" dirty="0" smtClean="0">
+                <a:solidFill>
+                  <a:schemeClr val="bg1"/>
+                </a:solidFill>
+              </a:rPr>
+              <a:t>Se puede hacer un análisis de sentimiento con la información dada y obtener una precisión que sea aceptable?</a:t>
+            </a:r>
+          </a:p>
+          <a:p>
+            <a:r>
+              <a:rPr lang="es-MX" dirty="0" smtClean="0">
+                <a:solidFill>
+                  <a:schemeClr val="bg1"/>
+                </a:solidFill>
+              </a:rPr>
+              <a:t>Con este análisis poder determinar si los compradores están satisfechos con los teléfonos celulares en </a:t>
+            </a:r>
+            <a:r>
+              <a:rPr lang="es-MX" dirty="0" err="1" smtClean="0">
+                <a:solidFill>
+                  <a:schemeClr val="bg1"/>
+                </a:solidFill>
+              </a:rPr>
+              <a:t>amazon</a:t>
+            </a:r>
+            <a:endParaRPr lang="es-MX" dirty="0" smtClean="0">
+              <a:solidFill>
+                <a:schemeClr val="bg1"/>
+              </a:solidFill>
+            </a:endParaRPr>
+          </a:p>
+          <a:p>
             <a:endParaRPr lang="en-US" dirty="0"/>
           </a:p>
         </p:txBody>
@@ -3344,6 +4371,13 @@
   <p:clrMapOvr>
     <a:masterClrMapping/>
   </p:clrMapOvr>
+  <p:timing>
+    <p:tnLst>
+      <p:par>
+        <p:cTn id="1" dur="indefinite" restart="never" nodeType="tmRoot"/>
+      </p:par>
+    </p:tnLst>
+  </p:timing>
 </p:sld>
 </file>
 
@@ -3371,13 +4405,41 @@
             <a:spLocks noGrp="1"/>
           </p:cNvSpPr>
           <p:nvPr>
-            <p:ph type="title"/>
+            <p:ph type="ctrTitle"/>
           </p:nvPr>
         </p:nvSpPr>
         <p:spPr>
           <a:xfrm>
-            <a:off x="381000" y="722144"/>
-            <a:ext cx="8229600" cy="792162"/>
+            <a:off x="609600" y="685800"/>
+            <a:ext cx="7772400" cy="1470025"/>
+          </a:xfrm>
+        </p:spPr>
+        <p:txBody>
+          <a:bodyPr/>
+          <a:lstStyle/>
+          <a:p>
+            <a:r>
+              <a:rPr lang="es-MX" dirty="0" smtClean="0"/>
+              <a:t>Alcance </a:t>
+            </a:r>
+            <a:endParaRPr lang="en-US" dirty="0"/>
+          </a:p>
+        </p:txBody>
+      </p:sp>
+      <p:sp>
+        <p:nvSpPr>
+          <p:cNvPr id="3" name="Subtitle 2"/>
+          <p:cNvSpPr>
+            <a:spLocks noGrp="1"/>
+          </p:cNvSpPr>
+          <p:nvPr>
+            <p:ph type="subTitle" idx="1"/>
+          </p:nvPr>
+        </p:nvSpPr>
+        <p:spPr>
+          <a:xfrm>
+            <a:off x="1371600" y="1981200"/>
+            <a:ext cx="6400800" cy="2590800"/>
           </a:xfrm>
         </p:spPr>
         <p:txBody>
@@ -3387,218 +4449,18 @@
           <a:lstStyle/>
           <a:p>
             <a:r>
-              <a:rPr lang="es-MX" sz="3200" dirty="0" smtClean="0">
+              <a:rPr lang="es-MX" dirty="0" smtClean="0">
                 <a:solidFill>
                   <a:schemeClr val="bg1"/>
                 </a:solidFill>
               </a:rPr>
-              <a:t>Exploración de datos</a:t>
-            </a:r>
-            <a:endParaRPr lang="en-US" sz="3200" dirty="0">
+              <a:t>Hacer un análisis de sentimiento con algunos de los algoritmos de clasificación y obtener al menos una precisión aceptable(0.7) y con esto determinar la satisfacción del cliente </a:t>
+            </a:r>
+            <a:endParaRPr lang="en-US" dirty="0">
               <a:solidFill>
                 <a:schemeClr val="bg1"/>
               </a:solidFill>
             </a:endParaRPr>
-          </a:p>
-        </p:txBody>
-      </p:sp>
-      <p:pic>
-        <p:nvPicPr>
-          <p:cNvPr id="1026" name="Picture 2"/>
-          <p:cNvPicPr>
-            <a:picLocks noGrp="1" noChangeAspect="1" noChangeArrowheads="1"/>
-          </p:cNvPicPr>
-          <p:nvPr>
-            <p:ph idx="1"/>
-          </p:nvPr>
-        </p:nvPicPr>
-        <p:blipFill>
-          <a:blip r:embed="rId2" cstate="print"/>
-          <a:srcRect/>
-          <a:stretch>
-            <a:fillRect/>
-          </a:stretch>
-        </p:blipFill>
-        <p:spPr bwMode="auto">
-          <a:xfrm>
-            <a:off x="606088" y="4830268"/>
-            <a:ext cx="7461740" cy="1951532"/>
-          </a:xfrm>
-          <a:prstGeom prst="rect">
-            <a:avLst/>
-          </a:prstGeom>
-          <a:noFill/>
-          <a:ln w="9525">
-            <a:noFill/>
-            <a:miter lim="800000"/>
-            <a:headEnd/>
-            <a:tailEnd/>
-          </a:ln>
-        </p:spPr>
-      </p:pic>
-      <p:pic>
-        <p:nvPicPr>
-          <p:cNvPr id="1027" name="Picture 3"/>
-          <p:cNvPicPr>
-            <a:picLocks noChangeAspect="1" noChangeArrowheads="1"/>
-          </p:cNvPicPr>
-          <p:nvPr/>
-        </p:nvPicPr>
-        <p:blipFill>
-          <a:blip r:embed="rId3" cstate="print"/>
-          <a:srcRect/>
-          <a:stretch>
-            <a:fillRect/>
-          </a:stretch>
-        </p:blipFill>
-        <p:spPr bwMode="auto">
-          <a:xfrm>
-            <a:off x="606088" y="1401268"/>
-            <a:ext cx="7848600" cy="1600532"/>
-          </a:xfrm>
-          <a:prstGeom prst="rect">
-            <a:avLst/>
-          </a:prstGeom>
-          <a:noFill/>
-          <a:ln w="9525">
-            <a:noFill/>
-            <a:miter lim="800000"/>
-            <a:headEnd/>
-            <a:tailEnd/>
-          </a:ln>
-        </p:spPr>
-      </p:pic>
-      <p:sp>
-        <p:nvSpPr>
-          <p:cNvPr id="6" name="TextBox 5"/>
-          <p:cNvSpPr txBox="1"/>
-          <p:nvPr/>
-        </p:nvSpPr>
-        <p:spPr>
-          <a:xfrm>
-            <a:off x="606088" y="3177370"/>
-            <a:ext cx="7315200" cy="1477328"/>
-          </a:xfrm>
-          <a:prstGeom prst="rect">
-            <a:avLst/>
-          </a:prstGeom>
-          <a:noFill/>
-        </p:spPr>
-        <p:txBody>
-          <a:bodyPr wrap="square" rtlCol="0">
-            <a:spAutoFit/>
-          </a:bodyPr>
-          <a:lstStyle/>
-          <a:p>
-            <a:r>
-              <a:rPr lang="es-MX" dirty="0" err="1" smtClean="0">
-                <a:solidFill>
-                  <a:schemeClr val="bg1"/>
-                </a:solidFill>
-              </a:rPr>
-              <a:t>Features</a:t>
-            </a:r>
-            <a:r>
-              <a:rPr lang="es-MX" dirty="0" smtClean="0">
-                <a:solidFill>
-                  <a:schemeClr val="bg1"/>
-                </a:solidFill>
-              </a:rPr>
-              <a:t> relevantes:</a:t>
-            </a:r>
-          </a:p>
-          <a:p>
-            <a:pPr>
-              <a:buFont typeface="Arial" pitchFamily="34" charset="0"/>
-              <a:buChar char="•"/>
-            </a:pPr>
-            <a:r>
-              <a:rPr lang="es-MX" dirty="0" smtClean="0">
-                <a:solidFill>
-                  <a:schemeClr val="bg1"/>
-                </a:solidFill>
-              </a:rPr>
-              <a:t> </a:t>
-            </a:r>
-            <a:r>
-              <a:rPr lang="es-MX" dirty="0" err="1" smtClean="0">
-                <a:solidFill>
-                  <a:schemeClr val="bg1"/>
-                </a:solidFill>
-              </a:rPr>
-              <a:t>asin</a:t>
-            </a:r>
-            <a:r>
-              <a:rPr lang="es-MX" dirty="0" smtClean="0">
-                <a:solidFill>
-                  <a:schemeClr val="bg1"/>
-                </a:solidFill>
-              </a:rPr>
-              <a:t>, identificador del equipo celular</a:t>
-            </a:r>
-          </a:p>
-          <a:p>
-            <a:pPr>
-              <a:buFont typeface="Arial" pitchFamily="34" charset="0"/>
-              <a:buChar char="•"/>
-            </a:pPr>
-            <a:r>
-              <a:rPr lang="es-MX" dirty="0" err="1" smtClean="0">
-                <a:solidFill>
-                  <a:schemeClr val="bg1"/>
-                </a:solidFill>
-              </a:rPr>
-              <a:t>Title</a:t>
-            </a:r>
-            <a:r>
-              <a:rPr lang="es-MX" dirty="0" smtClean="0">
-                <a:solidFill>
-                  <a:schemeClr val="bg1"/>
-                </a:solidFill>
-              </a:rPr>
-              <a:t>, el titulo de la reseña *</a:t>
-            </a:r>
-          </a:p>
-          <a:p>
-            <a:pPr>
-              <a:buFont typeface="Arial" pitchFamily="34" charset="0"/>
-              <a:buChar char="•"/>
-            </a:pPr>
-            <a:r>
-              <a:rPr lang="es-MX" dirty="0" err="1" smtClean="0">
-                <a:solidFill>
-                  <a:schemeClr val="bg1"/>
-                </a:solidFill>
-              </a:rPr>
-              <a:t>Body</a:t>
-            </a:r>
-            <a:r>
-              <a:rPr lang="es-MX" dirty="0" smtClean="0">
-                <a:solidFill>
-                  <a:schemeClr val="bg1"/>
-                </a:solidFill>
-              </a:rPr>
-              <a:t>,  el contenido de la reseña</a:t>
-            </a:r>
-          </a:p>
-          <a:p>
-            <a:pPr>
-              <a:buFont typeface="Arial" pitchFamily="34" charset="0"/>
-              <a:buChar char="•"/>
-            </a:pPr>
-            <a:r>
-              <a:rPr lang="es-MX" dirty="0" smtClean="0">
-                <a:solidFill>
-                  <a:schemeClr val="bg1"/>
-                </a:solidFill>
-              </a:rPr>
-              <a:t>Rating, calificación  dada al equipo </a:t>
-            </a:r>
-            <a:r>
-              <a:rPr lang="es-MX" dirty="0" smtClean="0"/>
-              <a:t>celular de 1 a 5</a:t>
-            </a:r>
-            <a:endParaRPr lang="en-US" dirty="0"/>
           </a:p>
         </p:txBody>
       </p:sp>
@@ -3607,13 +4469,6 @@
   <p:clrMapOvr>
     <a:masterClrMapping/>
   </p:clrMapOvr>
-  <p:timing>
-    <p:tnLst>
-      <p:par>
-        <p:cTn id="1" dur="indefinite" restart="never" nodeType="tmRoot"/>
-      </p:par>
-    </p:tnLst>
-  </p:timing>
 </p:sld>
 </file>
 
@@ -3641,13 +4496,13 @@
             <a:spLocks noGrp="1"/>
           </p:cNvSpPr>
           <p:nvPr>
-            <p:ph type="ctrTitle"/>
+            <p:ph type="title"/>
           </p:nvPr>
         </p:nvSpPr>
         <p:spPr>
           <a:xfrm>
-            <a:off x="228600" y="914400"/>
-            <a:ext cx="6248400" cy="688975"/>
+            <a:off x="381000" y="722144"/>
+            <a:ext cx="8229600" cy="792162"/>
           </a:xfrm>
         </p:spPr>
         <p:txBody>
@@ -3657,14 +4512,14 @@
           <a:lstStyle/>
           <a:p>
             <a:r>
-              <a:rPr lang="es-MX" sz="3000" dirty="0" smtClean="0">
+              <a:rPr lang="es-MX" sz="3200" dirty="0" smtClean="0">
                 <a:solidFill>
                   <a:schemeClr val="bg1"/>
                 </a:solidFill>
               </a:rPr>
-              <a:t>Lectura y transformación de los datos</a:t>
-            </a:r>
-            <a:endParaRPr lang="en-US" sz="3000" dirty="0">
+              <a:t>Exploración de datos</a:t>
+            </a:r>
+            <a:endParaRPr lang="en-US" sz="3200" dirty="0">
               <a:solidFill>
                 <a:schemeClr val="bg1"/>
               </a:solidFill>
@@ -3672,21 +4527,202 @@
           </a:p>
         </p:txBody>
       </p:sp>
-      <p:sp>
-        <p:nvSpPr>
-          <p:cNvPr id="3" name="Subtitle 2"/>
-          <p:cNvSpPr>
-            <a:spLocks noGrp="1"/>
-          </p:cNvSpPr>
-          <p:nvPr>
-            <p:ph type="subTitle" idx="1"/>
-          </p:nvPr>
-        </p:nvSpPr>
-        <p:spPr/>
-        <p:txBody>
-          <a:bodyPr/>
-          <a:lstStyle/>
-          <a:p>
+      <p:pic>
+        <p:nvPicPr>
+          <p:cNvPr id="1026" name="Picture 2"/>
+          <p:cNvPicPr>
+            <a:picLocks noGrp="1" noChangeAspect="1" noChangeArrowheads="1"/>
+          </p:cNvPicPr>
+          <p:nvPr>
+            <p:ph idx="1"/>
+          </p:nvPr>
+        </p:nvPicPr>
+        <p:blipFill>
+          <a:blip r:embed="rId2" cstate="print"/>
+          <a:srcRect/>
+          <a:stretch>
+            <a:fillRect/>
+          </a:stretch>
+        </p:blipFill>
+        <p:spPr bwMode="auto">
+          <a:xfrm>
+            <a:off x="606088" y="4830268"/>
+            <a:ext cx="7461740" cy="1951532"/>
+          </a:xfrm>
+          <a:prstGeom prst="rect">
+            <a:avLst/>
+          </a:prstGeom>
+          <a:noFill/>
+          <a:ln w="9525">
+            <a:noFill/>
+            <a:miter lim="800000"/>
+            <a:headEnd/>
+            <a:tailEnd/>
+          </a:ln>
+        </p:spPr>
+      </p:pic>
+      <p:pic>
+        <p:nvPicPr>
+          <p:cNvPr id="1027" name="Picture 3"/>
+          <p:cNvPicPr>
+            <a:picLocks noChangeAspect="1" noChangeArrowheads="1"/>
+          </p:cNvPicPr>
+          <p:nvPr/>
+        </p:nvPicPr>
+        <p:blipFill>
+          <a:blip r:embed="rId3" cstate="print"/>
+          <a:srcRect/>
+          <a:stretch>
+            <a:fillRect/>
+          </a:stretch>
+        </p:blipFill>
+        <p:spPr bwMode="auto">
+          <a:xfrm>
+            <a:off x="606088" y="1401268"/>
+            <a:ext cx="7848600" cy="1600532"/>
+          </a:xfrm>
+          <a:prstGeom prst="rect">
+            <a:avLst/>
+          </a:prstGeom>
+          <a:noFill/>
+          <a:ln w="9525">
+            <a:noFill/>
+            <a:miter lim="800000"/>
+            <a:headEnd/>
+            <a:tailEnd/>
+          </a:ln>
+        </p:spPr>
+      </p:pic>
+      <p:sp>
+        <p:nvSpPr>
+          <p:cNvPr id="6" name="TextBox 5"/>
+          <p:cNvSpPr txBox="1"/>
+          <p:nvPr/>
+        </p:nvSpPr>
+        <p:spPr>
+          <a:xfrm>
+            <a:off x="606088" y="3177370"/>
+            <a:ext cx="7315200" cy="1477328"/>
+          </a:xfrm>
+          <a:prstGeom prst="rect">
+            <a:avLst/>
+          </a:prstGeom>
+          <a:noFill/>
+        </p:spPr>
+        <p:txBody>
+          <a:bodyPr wrap="square" rtlCol="0">
+            <a:spAutoFit/>
+          </a:bodyPr>
+          <a:lstStyle/>
+          <a:p>
+            <a:r>
+              <a:rPr lang="es-MX" dirty="0" err="1" smtClean="0">
+                <a:solidFill>
+                  <a:schemeClr val="bg1"/>
+                </a:solidFill>
+              </a:rPr>
+              <a:t>Features</a:t>
+            </a:r>
+            <a:r>
+              <a:rPr lang="es-MX" dirty="0" smtClean="0">
+                <a:solidFill>
+                  <a:schemeClr val="bg1"/>
+                </a:solidFill>
+              </a:rPr>
+              <a:t> relevantes:</a:t>
+            </a:r>
+          </a:p>
+          <a:p>
+            <a:pPr>
+              <a:buFont typeface="Arial" pitchFamily="34" charset="0"/>
+              <a:buChar char="•"/>
+            </a:pPr>
+            <a:r>
+              <a:rPr lang="es-MX" dirty="0" smtClean="0">
+                <a:solidFill>
+                  <a:schemeClr val="bg1"/>
+                </a:solidFill>
+              </a:rPr>
+              <a:t> </a:t>
+            </a:r>
+            <a:r>
+              <a:rPr lang="es-MX" dirty="0" err="1" smtClean="0">
+                <a:solidFill>
+                  <a:schemeClr val="bg1"/>
+                </a:solidFill>
+              </a:rPr>
+              <a:t>asin</a:t>
+            </a:r>
+            <a:r>
+              <a:rPr lang="es-MX" dirty="0" smtClean="0">
+                <a:solidFill>
+                  <a:schemeClr val="bg1"/>
+                </a:solidFill>
+              </a:rPr>
+              <a:t>, identificador del equipo celular</a:t>
+            </a:r>
+          </a:p>
+          <a:p>
+            <a:pPr>
+              <a:buFont typeface="Arial" pitchFamily="34" charset="0"/>
+              <a:buChar char="•"/>
+            </a:pPr>
+            <a:r>
+              <a:rPr lang="es-MX" dirty="0" err="1" smtClean="0">
+                <a:solidFill>
+                  <a:schemeClr val="bg1"/>
+                </a:solidFill>
+              </a:rPr>
+              <a:t>Title</a:t>
+            </a:r>
+            <a:r>
+              <a:rPr lang="es-MX" dirty="0" smtClean="0">
+                <a:solidFill>
+                  <a:schemeClr val="bg1"/>
+                </a:solidFill>
+              </a:rPr>
+              <a:t>, el titulo de la reseña *</a:t>
+            </a:r>
+          </a:p>
+          <a:p>
+            <a:pPr>
+              <a:buFont typeface="Arial" pitchFamily="34" charset="0"/>
+              <a:buChar char="•"/>
+            </a:pPr>
+            <a:r>
+              <a:rPr lang="es-MX" dirty="0" err="1" smtClean="0">
+                <a:solidFill>
+                  <a:schemeClr val="bg1"/>
+                </a:solidFill>
+              </a:rPr>
+              <a:t>Body</a:t>
+            </a:r>
+            <a:r>
+              <a:rPr lang="es-MX" dirty="0" smtClean="0">
+                <a:solidFill>
+                  <a:schemeClr val="bg1"/>
+                </a:solidFill>
+              </a:rPr>
+              <a:t>,  el contenido de la reseña</a:t>
+            </a:r>
+          </a:p>
+          <a:p>
+            <a:pPr>
+              <a:buFont typeface="Arial" pitchFamily="34" charset="0"/>
+              <a:buChar char="•"/>
+            </a:pPr>
+            <a:r>
+              <a:rPr lang="es-MX" dirty="0" smtClean="0">
+                <a:solidFill>
+                  <a:schemeClr val="bg1"/>
+                </a:solidFill>
+              </a:rPr>
+              <a:t>Rating, calificación  dada al equipo </a:t>
+            </a:r>
+            <a:r>
+              <a:rPr lang="es-MX" dirty="0" smtClean="0"/>
+              <a:t>celular de 1 a 5</a:t>
+            </a:r>
             <a:endParaRPr lang="en-US" dirty="0"/>
           </a:p>
         </p:txBody>
@@ -3703,6 +4739,954 @@
       </p:par>
     </p:tnLst>
   </p:timing>
+</p:sld>
+</file>
+
+<file path=ppt/slides/slide6.xml><?xml version="1.0" encoding="utf-8"?>
+<p:sld xmlns:a="http://schemas.openxmlformats.org/drawingml/2006/main" xmlns:r="http://schemas.openxmlformats.org/officeDocument/2006/relationships" xmlns:p="http://schemas.openxmlformats.org/presentationml/2006/main">
+  <p:cSld>
+    <p:spTree>
+      <p:nvGrpSpPr>
+        <p:cNvPr id="1" name=""/>
+        <p:cNvGrpSpPr/>
+        <p:nvPr/>
+      </p:nvGrpSpPr>
+      <p:grpSpPr>
+        <a:xfrm>
+          <a:off x="0" y="0"/>
+          <a:ext cx="0" cy="0"/>
+          <a:chOff x="0" y="0"/>
+          <a:chExt cx="0" cy="0"/>
+        </a:xfrm>
+      </p:grpSpPr>
+      <p:sp>
+        <p:nvSpPr>
+          <p:cNvPr id="2" name="Title 1"/>
+          <p:cNvSpPr>
+            <a:spLocks noGrp="1"/>
+          </p:cNvSpPr>
+          <p:nvPr>
+            <p:ph type="ctrTitle"/>
+          </p:nvPr>
+        </p:nvSpPr>
+        <p:spPr>
+          <a:xfrm>
+            <a:off x="228600" y="914400"/>
+            <a:ext cx="6248400" cy="688975"/>
+          </a:xfrm>
+        </p:spPr>
+        <p:txBody>
+          <a:bodyPr>
+            <a:normAutofit/>
+          </a:bodyPr>
+          <a:lstStyle/>
+          <a:p>
+            <a:r>
+              <a:rPr lang="es-MX" sz="3000" dirty="0" smtClean="0">
+                <a:solidFill>
+                  <a:schemeClr val="bg1"/>
+                </a:solidFill>
+              </a:rPr>
+              <a:t>Lectura y transformación de los datos</a:t>
+            </a:r>
+            <a:endParaRPr lang="en-US" sz="3000" dirty="0">
+              <a:solidFill>
+                <a:schemeClr val="bg1"/>
+              </a:solidFill>
+            </a:endParaRPr>
+          </a:p>
+        </p:txBody>
+      </p:sp>
+      <p:sp>
+        <p:nvSpPr>
+          <p:cNvPr id="3" name="Subtitle 2"/>
+          <p:cNvSpPr>
+            <a:spLocks noGrp="1"/>
+          </p:cNvSpPr>
+          <p:nvPr>
+            <p:ph type="subTitle" idx="1"/>
+          </p:nvPr>
+        </p:nvSpPr>
+        <p:spPr>
+          <a:xfrm>
+            <a:off x="457200" y="1752600"/>
+            <a:ext cx="8382000" cy="1752600"/>
+          </a:xfrm>
+        </p:spPr>
+        <p:txBody>
+          <a:bodyPr>
+            <a:normAutofit lnSpcReduction="10000"/>
+          </a:bodyPr>
+          <a:lstStyle/>
+          <a:p>
+            <a:pPr algn="l"/>
+            <a:r>
+              <a:rPr lang="en-US" sz="2000" dirty="0" err="1">
+                <a:solidFill>
+                  <a:schemeClr val="bg2"/>
+                </a:solidFill>
+              </a:rPr>
+              <a:t>df_reviews</a:t>
+            </a:r>
+            <a:r>
+              <a:rPr lang="en-US" sz="2000" dirty="0">
+                <a:solidFill>
+                  <a:schemeClr val="bg2"/>
+                </a:solidFill>
+              </a:rPr>
+              <a:t> = </a:t>
+            </a:r>
+            <a:r>
+              <a:rPr lang="en-US" sz="2000" dirty="0" err="1">
+                <a:solidFill>
+                  <a:schemeClr val="bg2"/>
+                </a:solidFill>
+              </a:rPr>
+              <a:t>pd.read_csv</a:t>
+            </a:r>
+            <a:r>
+              <a:rPr lang="en-US" sz="2000" dirty="0">
+                <a:solidFill>
+                  <a:schemeClr val="bg2"/>
+                </a:solidFill>
+              </a:rPr>
+              <a:t>('</a:t>
+            </a:r>
+            <a:r>
+              <a:rPr lang="en-US" sz="2000" dirty="0" err="1">
+                <a:solidFill>
+                  <a:schemeClr val="bg2"/>
+                </a:solidFill>
+              </a:rPr>
+              <a:t>amazon</a:t>
+            </a:r>
+            <a:r>
+              <a:rPr lang="en-US" sz="2000" dirty="0">
+                <a:solidFill>
+                  <a:schemeClr val="bg2"/>
+                </a:solidFill>
+              </a:rPr>
+              <a:t>-cell-phones-reviews/20190928-reviews.csv</a:t>
+            </a:r>
+            <a:r>
+              <a:rPr lang="en-US" sz="2000" dirty="0" smtClean="0">
+                <a:solidFill>
+                  <a:schemeClr val="bg2"/>
+                </a:solidFill>
+              </a:rPr>
+              <a:t>')</a:t>
+            </a:r>
+          </a:p>
+          <a:p>
+            <a:pPr algn="l"/>
+            <a:endParaRPr lang="en-US" sz="2000" dirty="0">
+              <a:solidFill>
+                <a:schemeClr val="bg2"/>
+              </a:solidFill>
+            </a:endParaRPr>
+          </a:p>
+          <a:p>
+            <a:pPr algn="l"/>
+            <a:r>
+              <a:rPr lang="en-US" sz="2000" dirty="0">
+                <a:solidFill>
+                  <a:schemeClr val="bg2"/>
+                </a:solidFill>
+              </a:rPr>
+              <a:t>df_reviews.loc[</a:t>
+            </a:r>
+            <a:r>
+              <a:rPr lang="en-US" sz="2000" dirty="0" err="1">
+                <a:solidFill>
+                  <a:schemeClr val="bg2"/>
+                </a:solidFill>
+              </a:rPr>
+              <a:t>df_reviews</a:t>
+            </a:r>
+            <a:r>
+              <a:rPr lang="en-US" sz="2000" dirty="0">
+                <a:solidFill>
+                  <a:schemeClr val="bg2"/>
+                </a:solidFill>
+              </a:rPr>
+              <a:t>['rating</a:t>
+            </a:r>
+            <a:r>
+              <a:rPr lang="en-US" sz="2000" dirty="0" smtClean="0">
+                <a:solidFill>
+                  <a:schemeClr val="bg2"/>
+                </a:solidFill>
+              </a:rPr>
+              <a:t>']  &lt;=3</a:t>
+            </a:r>
+            <a:r>
+              <a:rPr lang="en-US" sz="2000" dirty="0">
+                <a:solidFill>
+                  <a:schemeClr val="bg2"/>
+                </a:solidFill>
+              </a:rPr>
+              <a:t>, 'appreciation'] = 0</a:t>
+            </a:r>
+          </a:p>
+          <a:p>
+            <a:pPr algn="l"/>
+            <a:r>
+              <a:rPr lang="en-US" sz="2000" dirty="0">
+                <a:solidFill>
+                  <a:schemeClr val="bg2"/>
+                </a:solidFill>
+              </a:rPr>
+              <a:t>df_reviews.loc[</a:t>
+            </a:r>
+            <a:r>
+              <a:rPr lang="en-US" sz="2000" dirty="0" err="1">
+                <a:solidFill>
+                  <a:schemeClr val="bg2"/>
+                </a:solidFill>
+              </a:rPr>
+              <a:t>df_reviews</a:t>
+            </a:r>
+            <a:r>
+              <a:rPr lang="en-US" sz="2000" dirty="0">
+                <a:solidFill>
+                  <a:schemeClr val="bg2"/>
+                </a:solidFill>
+              </a:rPr>
+              <a:t>['rating'] </a:t>
+            </a:r>
+            <a:r>
+              <a:rPr lang="en-US" sz="2000" dirty="0" smtClean="0">
+                <a:solidFill>
+                  <a:schemeClr val="bg2"/>
+                </a:solidFill>
+              </a:rPr>
+              <a:t> &gt;</a:t>
+            </a:r>
+            <a:r>
+              <a:rPr lang="en-US" sz="2000" dirty="0">
+                <a:solidFill>
+                  <a:schemeClr val="bg2"/>
+                </a:solidFill>
+              </a:rPr>
+              <a:t> 3, 'appreciation'] = </a:t>
+            </a:r>
+            <a:r>
+              <a:rPr lang="en-US" sz="2000" dirty="0" smtClean="0">
+                <a:solidFill>
+                  <a:schemeClr val="bg2"/>
+                </a:solidFill>
+              </a:rPr>
+              <a:t>1</a:t>
+            </a:r>
+            <a:endParaRPr lang="en-US" sz="2000" dirty="0">
+              <a:solidFill>
+                <a:schemeClr val="bg2"/>
+              </a:solidFill>
+            </a:endParaRPr>
+          </a:p>
+          <a:p>
+            <a:endParaRPr lang="en-US" dirty="0"/>
+          </a:p>
+        </p:txBody>
+      </p:sp>
+      <p:sp>
+        <p:nvSpPr>
+          <p:cNvPr id="2052" name="AutoShape 4" descr="Image result for happy neutral sad face"/>
+          <p:cNvSpPr>
+            <a:spLocks noChangeAspect="1" noChangeArrowheads="1"/>
+          </p:cNvSpPr>
+          <p:nvPr/>
+        </p:nvSpPr>
+        <p:spPr bwMode="auto">
+          <a:xfrm>
+            <a:off x="155575" y="-144463"/>
+            <a:ext cx="304800" cy="304801"/>
+          </a:xfrm>
+          <a:prstGeom prst="rect">
+            <a:avLst/>
+          </a:prstGeom>
+          <a:noFill/>
+        </p:spPr>
+        <p:txBody>
+          <a:bodyPr vert="horz" wrap="square" lIns="91440" tIns="45720" rIns="91440" bIns="45720" numCol="1" anchor="t" anchorCtr="0" compatLnSpc="1">
+            <a:prstTxWarp prst="textNoShape">
+              <a:avLst/>
+            </a:prstTxWarp>
+          </a:bodyPr>
+          <a:lstStyle/>
+          <a:p>
+            <a:endParaRPr lang="en-US"/>
+          </a:p>
+        </p:txBody>
+      </p:sp>
+      <p:sp>
+        <p:nvSpPr>
+          <p:cNvPr id="2054" name="AutoShape 6" descr="Image result for happy neutral sad face"/>
+          <p:cNvSpPr>
+            <a:spLocks noChangeAspect="1" noChangeArrowheads="1"/>
+          </p:cNvSpPr>
+          <p:nvPr/>
+        </p:nvSpPr>
+        <p:spPr bwMode="auto">
+          <a:xfrm>
+            <a:off x="155575" y="-144463"/>
+            <a:ext cx="304800" cy="304801"/>
+          </a:xfrm>
+          <a:prstGeom prst="rect">
+            <a:avLst/>
+          </a:prstGeom>
+          <a:noFill/>
+        </p:spPr>
+        <p:txBody>
+          <a:bodyPr vert="horz" wrap="square" lIns="91440" tIns="45720" rIns="91440" bIns="45720" numCol="1" anchor="t" anchorCtr="0" compatLnSpc="1">
+            <a:prstTxWarp prst="textNoShape">
+              <a:avLst/>
+            </a:prstTxWarp>
+          </a:bodyPr>
+          <a:lstStyle/>
+          <a:p>
+            <a:endParaRPr lang="en-US"/>
+          </a:p>
+        </p:txBody>
+      </p:sp>
+      <p:sp>
+        <p:nvSpPr>
+          <p:cNvPr id="2056" name="AutoShape 8" descr="Image result for happy neutral sad face"/>
+          <p:cNvSpPr>
+            <a:spLocks noChangeAspect="1" noChangeArrowheads="1"/>
+          </p:cNvSpPr>
+          <p:nvPr/>
+        </p:nvSpPr>
+        <p:spPr bwMode="auto">
+          <a:xfrm>
+            <a:off x="155575" y="-144463"/>
+            <a:ext cx="304800" cy="304801"/>
+          </a:xfrm>
+          <a:prstGeom prst="rect">
+            <a:avLst/>
+          </a:prstGeom>
+          <a:noFill/>
+        </p:spPr>
+        <p:txBody>
+          <a:bodyPr vert="horz" wrap="square" lIns="91440" tIns="45720" rIns="91440" bIns="45720" numCol="1" anchor="t" anchorCtr="0" compatLnSpc="1">
+            <a:prstTxWarp prst="textNoShape">
+              <a:avLst/>
+            </a:prstTxWarp>
+          </a:bodyPr>
+          <a:lstStyle/>
+          <a:p>
+            <a:endParaRPr lang="en-US"/>
+          </a:p>
+        </p:txBody>
+      </p:sp>
+      <p:pic>
+        <p:nvPicPr>
+          <p:cNvPr id="9" name="Picture 8" descr="faces-no-background.png"/>
+          <p:cNvPicPr>
+            <a:picLocks noChangeAspect="1"/>
+          </p:cNvPicPr>
+          <p:nvPr/>
+        </p:nvPicPr>
+        <p:blipFill>
+          <a:blip r:embed="rId2" cstate="print"/>
+          <a:stretch>
+            <a:fillRect/>
+          </a:stretch>
+        </p:blipFill>
+        <p:spPr>
+          <a:xfrm>
+            <a:off x="457200" y="5257800"/>
+            <a:ext cx="3400425" cy="1343025"/>
+          </a:xfrm>
+          <a:prstGeom prst="rect">
+            <a:avLst/>
+          </a:prstGeom>
+        </p:spPr>
+      </p:pic>
+      <p:pic>
+        <p:nvPicPr>
+          <p:cNvPr id="2058" name="Picture 10"/>
+          <p:cNvPicPr>
+            <a:picLocks noChangeAspect="1" noChangeArrowheads="1"/>
+          </p:cNvPicPr>
+          <p:nvPr/>
+        </p:nvPicPr>
+        <p:blipFill>
+          <a:blip r:embed="rId3" cstate="print"/>
+          <a:srcRect/>
+          <a:stretch>
+            <a:fillRect/>
+          </a:stretch>
+        </p:blipFill>
+        <p:spPr bwMode="auto">
+          <a:xfrm>
+            <a:off x="533400" y="3581400"/>
+            <a:ext cx="4842087" cy="1447800"/>
+          </a:xfrm>
+          <a:prstGeom prst="rect">
+            <a:avLst/>
+          </a:prstGeom>
+          <a:noFill/>
+          <a:ln w="9525">
+            <a:noFill/>
+            <a:miter lim="800000"/>
+            <a:headEnd/>
+            <a:tailEnd/>
+          </a:ln>
+        </p:spPr>
+      </p:pic>
+    </p:spTree>
+  </p:cSld>
+  <p:clrMapOvr>
+    <a:masterClrMapping/>
+  </p:clrMapOvr>
+  <p:timing>
+    <p:tnLst>
+      <p:par>
+        <p:cTn id="1" dur="indefinite" restart="never" nodeType="tmRoot"/>
+      </p:par>
+    </p:tnLst>
+  </p:timing>
+</p:sld>
+</file>
+
+<file path=ppt/slides/slide7.xml><?xml version="1.0" encoding="utf-8"?>
+<p:sld xmlns:a="http://schemas.openxmlformats.org/drawingml/2006/main" xmlns:r="http://schemas.openxmlformats.org/officeDocument/2006/relationships" xmlns:p="http://schemas.openxmlformats.org/presentationml/2006/main">
+  <p:cSld>
+    <p:spTree>
+      <p:nvGrpSpPr>
+        <p:cNvPr id="1" name=""/>
+        <p:cNvGrpSpPr/>
+        <p:nvPr/>
+      </p:nvGrpSpPr>
+      <p:grpSpPr>
+        <a:xfrm>
+          <a:off x="0" y="0"/>
+          <a:ext cx="0" cy="0"/>
+          <a:chOff x="0" y="0"/>
+          <a:chExt cx="0" cy="0"/>
+        </a:xfrm>
+      </p:grpSpPr>
+      <p:sp>
+        <p:nvSpPr>
+          <p:cNvPr id="2" name="Title 1"/>
+          <p:cNvSpPr>
+            <a:spLocks noGrp="1"/>
+          </p:cNvSpPr>
+          <p:nvPr>
+            <p:ph type="title"/>
+          </p:nvPr>
+        </p:nvSpPr>
+        <p:spPr>
+          <a:xfrm>
+            <a:off x="457200" y="879562"/>
+            <a:ext cx="8229600" cy="715962"/>
+          </a:xfrm>
+        </p:spPr>
+        <p:txBody>
+          <a:bodyPr>
+            <a:normAutofit/>
+          </a:bodyPr>
+          <a:lstStyle/>
+          <a:p>
+            <a:r>
+              <a:rPr lang="es-MX" sz="3200" dirty="0" smtClean="0">
+                <a:solidFill>
+                  <a:schemeClr val="bg2"/>
+                </a:solidFill>
+              </a:rPr>
+              <a:t>Entrenar un modelo</a:t>
+            </a:r>
+            <a:endParaRPr lang="en-US" sz="3200" dirty="0">
+              <a:solidFill>
+                <a:schemeClr val="bg2"/>
+              </a:solidFill>
+            </a:endParaRPr>
+          </a:p>
+        </p:txBody>
+      </p:sp>
+      <p:sp>
+        <p:nvSpPr>
+          <p:cNvPr id="3" name="Content Placeholder 2"/>
+          <p:cNvSpPr>
+            <a:spLocks noGrp="1"/>
+          </p:cNvSpPr>
+          <p:nvPr>
+            <p:ph idx="1"/>
+          </p:nvPr>
+        </p:nvSpPr>
+        <p:spPr>
+          <a:xfrm>
+            <a:off x="457200" y="1600201"/>
+            <a:ext cx="8229600" cy="1219200"/>
+          </a:xfrm>
+        </p:spPr>
+        <p:txBody>
+          <a:bodyPr>
+            <a:normAutofit/>
+          </a:bodyPr>
+          <a:lstStyle/>
+          <a:p>
+            <a:r>
+              <a:rPr lang="es-MX" sz="2400" dirty="0" err="1" smtClean="0">
+                <a:solidFill>
+                  <a:schemeClr val="bg2"/>
+                </a:solidFill>
+              </a:rPr>
+              <a:t>Naive</a:t>
+            </a:r>
+            <a:r>
+              <a:rPr lang="es-MX" sz="2400" dirty="0" smtClean="0">
+                <a:solidFill>
+                  <a:schemeClr val="bg2"/>
+                </a:solidFill>
+              </a:rPr>
+              <a:t> </a:t>
+            </a:r>
+            <a:r>
+              <a:rPr lang="es-MX" sz="2400" dirty="0" err="1" smtClean="0">
+                <a:solidFill>
+                  <a:schemeClr val="bg2"/>
+                </a:solidFill>
+              </a:rPr>
+              <a:t>Bayes</a:t>
+            </a:r>
+            <a:r>
+              <a:rPr lang="es-MX" sz="2400" dirty="0" smtClean="0">
+                <a:solidFill>
+                  <a:schemeClr val="bg2"/>
+                </a:solidFill>
+              </a:rPr>
+              <a:t> </a:t>
+            </a:r>
+            <a:r>
+              <a:rPr lang="es-MX" sz="2400" dirty="0" err="1" smtClean="0">
+                <a:solidFill>
+                  <a:schemeClr val="bg2"/>
+                </a:solidFill>
+              </a:rPr>
+              <a:t>Classifier</a:t>
+            </a:r>
+            <a:r>
+              <a:rPr lang="es-MX" sz="2400" dirty="0" smtClean="0">
+                <a:solidFill>
+                  <a:schemeClr val="bg2"/>
+                </a:solidFill>
+              </a:rPr>
+              <a:t> el modelo mas sencillo para clasificar</a:t>
+            </a:r>
+            <a:endParaRPr lang="en-US" sz="2400" dirty="0">
+              <a:solidFill>
+                <a:schemeClr val="bg2"/>
+              </a:solidFill>
+            </a:endParaRPr>
+          </a:p>
+        </p:txBody>
+      </p:sp>
+      <p:pic>
+        <p:nvPicPr>
+          <p:cNvPr id="18436" name="Picture 4"/>
+          <p:cNvPicPr>
+            <a:picLocks noChangeAspect="1" noChangeArrowheads="1"/>
+          </p:cNvPicPr>
+          <p:nvPr/>
+        </p:nvPicPr>
+        <p:blipFill>
+          <a:blip r:embed="rId2" cstate="print"/>
+          <a:srcRect/>
+          <a:stretch>
+            <a:fillRect/>
+          </a:stretch>
+        </p:blipFill>
+        <p:spPr bwMode="auto">
+          <a:xfrm>
+            <a:off x="533400" y="2057400"/>
+            <a:ext cx="6372225" cy="4610100"/>
+          </a:xfrm>
+          <a:prstGeom prst="rect">
+            <a:avLst/>
+          </a:prstGeom>
+          <a:noFill/>
+          <a:ln w="9525">
+            <a:noFill/>
+            <a:miter lim="800000"/>
+            <a:headEnd/>
+            <a:tailEnd/>
+          </a:ln>
+        </p:spPr>
+      </p:pic>
+    </p:spTree>
+  </p:cSld>
+  <p:clrMapOvr>
+    <a:masterClrMapping/>
+  </p:clrMapOvr>
+</p:sld>
+</file>
+
+<file path=ppt/slides/slide8.xml><?xml version="1.0" encoding="utf-8"?>
+<p:sld xmlns:a="http://schemas.openxmlformats.org/drawingml/2006/main" xmlns:r="http://schemas.openxmlformats.org/officeDocument/2006/relationships" xmlns:p="http://schemas.openxmlformats.org/presentationml/2006/main">
+  <p:cSld>
+    <p:spTree>
+      <p:nvGrpSpPr>
+        <p:cNvPr id="1" name=""/>
+        <p:cNvGrpSpPr/>
+        <p:nvPr/>
+      </p:nvGrpSpPr>
+      <p:grpSpPr>
+        <a:xfrm>
+          <a:off x="0" y="0"/>
+          <a:ext cx="0" cy="0"/>
+          <a:chOff x="0" y="0"/>
+          <a:chExt cx="0" cy="0"/>
+        </a:xfrm>
+      </p:grpSpPr>
+      <p:sp>
+        <p:nvSpPr>
+          <p:cNvPr id="2" name="Title 1"/>
+          <p:cNvSpPr>
+            <a:spLocks noGrp="1"/>
+          </p:cNvSpPr>
+          <p:nvPr>
+            <p:ph type="title"/>
+          </p:nvPr>
+        </p:nvSpPr>
+        <p:spPr>
+          <a:xfrm>
+            <a:off x="457200" y="990600"/>
+            <a:ext cx="8229600" cy="1143000"/>
+          </a:xfrm>
+        </p:spPr>
+        <p:txBody>
+          <a:bodyPr>
+            <a:normAutofit/>
+          </a:bodyPr>
+          <a:lstStyle/>
+          <a:p>
+            <a:r>
+              <a:rPr lang="es-MX" sz="3200" dirty="0" smtClean="0">
+                <a:solidFill>
+                  <a:schemeClr val="bg1"/>
+                </a:solidFill>
+              </a:rPr>
+              <a:t>30 palabras mas informativas </a:t>
+            </a:r>
+            <a:br>
+              <a:rPr lang="es-MX" sz="3200" dirty="0" smtClean="0">
+                <a:solidFill>
+                  <a:schemeClr val="bg1"/>
+                </a:solidFill>
+              </a:rPr>
+            </a:br>
+            <a:r>
+              <a:rPr lang="es-MX" sz="3200" dirty="0" smtClean="0">
+                <a:solidFill>
+                  <a:schemeClr val="bg1"/>
+                </a:solidFill>
+              </a:rPr>
+              <a:t>del entrenamiento</a:t>
+            </a:r>
+            <a:endParaRPr lang="en-US" sz="3200" dirty="0">
+              <a:solidFill>
+                <a:schemeClr val="bg1"/>
+              </a:solidFill>
+            </a:endParaRPr>
+          </a:p>
+        </p:txBody>
+      </p:sp>
+      <p:pic>
+        <p:nvPicPr>
+          <p:cNvPr id="24578" name="Picture 2"/>
+          <p:cNvPicPr>
+            <a:picLocks noGrp="1" noChangeAspect="1" noChangeArrowheads="1"/>
+          </p:cNvPicPr>
+          <p:nvPr>
+            <p:ph idx="1"/>
+          </p:nvPr>
+        </p:nvPicPr>
+        <p:blipFill>
+          <a:blip r:embed="rId2" cstate="print"/>
+          <a:srcRect/>
+          <a:stretch>
+            <a:fillRect/>
+          </a:stretch>
+        </p:blipFill>
+        <p:spPr bwMode="auto">
+          <a:xfrm>
+            <a:off x="685800" y="2162969"/>
+            <a:ext cx="7239000" cy="3841446"/>
+          </a:xfrm>
+          <a:prstGeom prst="rect">
+            <a:avLst/>
+          </a:prstGeom>
+          <a:noFill/>
+          <a:ln w="9525">
+            <a:noFill/>
+            <a:miter lim="800000"/>
+            <a:headEnd/>
+            <a:tailEnd/>
+          </a:ln>
+        </p:spPr>
+      </p:pic>
+    </p:spTree>
+  </p:cSld>
+  <p:clrMapOvr>
+    <a:masterClrMapping/>
+  </p:clrMapOvr>
+</p:sld>
+</file>
+
+<file path=ppt/slides/slide9.xml><?xml version="1.0" encoding="utf-8"?>
+<p:sld xmlns:a="http://schemas.openxmlformats.org/drawingml/2006/main" xmlns:r="http://schemas.openxmlformats.org/officeDocument/2006/relationships" xmlns:p="http://schemas.openxmlformats.org/presentationml/2006/main">
+  <p:cSld>
+    <p:spTree>
+      <p:nvGrpSpPr>
+        <p:cNvPr id="1" name=""/>
+        <p:cNvGrpSpPr/>
+        <p:nvPr/>
+      </p:nvGrpSpPr>
+      <p:grpSpPr>
+        <a:xfrm>
+          <a:off x="0" y="0"/>
+          <a:ext cx="0" cy="0"/>
+          <a:chOff x="0" y="0"/>
+          <a:chExt cx="0" cy="0"/>
+        </a:xfrm>
+      </p:grpSpPr>
+      <p:sp>
+        <p:nvSpPr>
+          <p:cNvPr id="2" name="Title 1"/>
+          <p:cNvSpPr>
+            <a:spLocks noGrp="1"/>
+          </p:cNvSpPr>
+          <p:nvPr>
+            <p:ph type="title"/>
+          </p:nvPr>
+        </p:nvSpPr>
+        <p:spPr>
+          <a:xfrm>
+            <a:off x="457200" y="778416"/>
+            <a:ext cx="8229600" cy="685800"/>
+          </a:xfrm>
+        </p:spPr>
+        <p:txBody>
+          <a:bodyPr>
+            <a:normAutofit/>
+          </a:bodyPr>
+          <a:lstStyle/>
+          <a:p>
+            <a:r>
+              <a:rPr lang="es-MX" sz="3200" dirty="0" smtClean="0">
+                <a:solidFill>
+                  <a:schemeClr val="bg2"/>
+                </a:solidFill>
+              </a:rPr>
+              <a:t>Entrenar con otros clasificadores</a:t>
+            </a:r>
+            <a:endParaRPr lang="en-US" sz="3200" dirty="0">
+              <a:solidFill>
+                <a:schemeClr val="bg2"/>
+              </a:solidFill>
+            </a:endParaRPr>
+          </a:p>
+        </p:txBody>
+      </p:sp>
+      <p:sp>
+        <p:nvSpPr>
+          <p:cNvPr id="3" name="Content Placeholder 2"/>
+          <p:cNvSpPr>
+            <a:spLocks noGrp="1"/>
+          </p:cNvSpPr>
+          <p:nvPr>
+            <p:ph idx="1"/>
+          </p:nvPr>
+        </p:nvSpPr>
+        <p:spPr>
+          <a:xfrm>
+            <a:off x="457200" y="1600201"/>
+            <a:ext cx="8229600" cy="2286000"/>
+          </a:xfrm>
+        </p:spPr>
+        <p:txBody>
+          <a:bodyPr>
+            <a:normAutofit fontScale="92500" lnSpcReduction="10000"/>
+          </a:bodyPr>
+          <a:lstStyle/>
+          <a:p>
+            <a:r>
+              <a:rPr lang="es-MX" sz="2400" dirty="0" err="1" smtClean="0">
+                <a:solidFill>
+                  <a:schemeClr val="bg2"/>
+                </a:solidFill>
+              </a:rPr>
+              <a:t>Naive</a:t>
+            </a:r>
+            <a:r>
+              <a:rPr lang="es-MX" sz="2400" dirty="0" smtClean="0">
+                <a:solidFill>
+                  <a:schemeClr val="bg2"/>
+                </a:solidFill>
+              </a:rPr>
+              <a:t> </a:t>
+            </a:r>
+            <a:r>
+              <a:rPr lang="es-MX" sz="2400" dirty="0" err="1" smtClean="0">
+                <a:solidFill>
+                  <a:schemeClr val="bg2"/>
+                </a:solidFill>
+              </a:rPr>
+              <a:t>Bayes</a:t>
+            </a:r>
+            <a:r>
+              <a:rPr lang="es-MX" sz="2400" dirty="0" smtClean="0">
+                <a:solidFill>
+                  <a:schemeClr val="bg2"/>
+                </a:solidFill>
+              </a:rPr>
+              <a:t>					</a:t>
+            </a:r>
+            <a:r>
+              <a:rPr lang="en-US" sz="2400" dirty="0" smtClean="0">
+                <a:solidFill>
+                  <a:schemeClr val="bg2"/>
+                </a:solidFill>
+              </a:rPr>
+              <a:t>83.47621347500603</a:t>
+            </a:r>
+          </a:p>
+          <a:p>
+            <a:r>
+              <a:rPr lang="en-US" sz="2400" dirty="0" err="1" smtClean="0">
+                <a:solidFill>
+                  <a:schemeClr val="bg2"/>
+                </a:solidFill>
+              </a:rPr>
+              <a:t>MultinomialNB</a:t>
+            </a:r>
+            <a:r>
+              <a:rPr lang="en-US" sz="2400" dirty="0" smtClean="0">
+                <a:solidFill>
+                  <a:schemeClr val="bg2"/>
+                </a:solidFill>
+              </a:rPr>
+              <a:t>				86.79063028254045</a:t>
+            </a:r>
+          </a:p>
+          <a:p>
+            <a:r>
+              <a:rPr lang="en-US" sz="2400" dirty="0" err="1" smtClean="0">
+                <a:solidFill>
+                  <a:schemeClr val="bg2"/>
+                </a:solidFill>
+              </a:rPr>
+              <a:t>BernoulliNB</a:t>
+            </a:r>
+            <a:r>
+              <a:rPr lang="en-US" sz="2400" dirty="0" smtClean="0">
+                <a:solidFill>
+                  <a:schemeClr val="bg2"/>
+                </a:solidFill>
+              </a:rPr>
+              <a:t>					81.2967882154069</a:t>
+            </a:r>
+          </a:p>
+          <a:p>
+            <a:r>
+              <a:rPr lang="en-US" sz="2400" dirty="0" err="1" smtClean="0">
+                <a:solidFill>
+                  <a:schemeClr val="bg2"/>
+                </a:solidFill>
+              </a:rPr>
+              <a:t>LogisticRegression</a:t>
+            </a:r>
+            <a:r>
+              <a:rPr lang="en-US" sz="2400" dirty="0" smtClean="0">
+                <a:solidFill>
+                  <a:schemeClr val="bg2"/>
+                </a:solidFill>
+              </a:rPr>
+              <a:t>				87.37623762376238</a:t>
+            </a:r>
+          </a:p>
+          <a:p>
+            <a:r>
+              <a:rPr lang="en-US" sz="2400" dirty="0" err="1" smtClean="0">
+                <a:solidFill>
+                  <a:schemeClr val="bg2"/>
+                </a:solidFill>
+              </a:rPr>
+              <a:t>SGDClassifier</a:t>
+            </a:r>
+            <a:r>
+              <a:rPr lang="en-US" sz="2400" dirty="0" smtClean="0">
+                <a:solidFill>
+                  <a:schemeClr val="bg2"/>
+                </a:solidFill>
+              </a:rPr>
+              <a:t>				87.58150205264428</a:t>
+            </a:r>
+          </a:p>
+          <a:p>
+            <a:r>
+              <a:rPr lang="en-US" sz="2400" dirty="0" err="1" smtClean="0">
+                <a:solidFill>
+                  <a:schemeClr val="bg2"/>
+                </a:solidFill>
+              </a:rPr>
+              <a:t>LinearSVC</a:t>
+            </a:r>
+            <a:r>
+              <a:rPr lang="en-US" sz="2400" dirty="0" smtClean="0">
+                <a:solidFill>
+                  <a:schemeClr val="bg2"/>
+                </a:solidFill>
+              </a:rPr>
+              <a:t>					85.75223375996136</a:t>
+            </a:r>
+            <a:endParaRPr lang="en-US" sz="2400" dirty="0">
+              <a:solidFill>
+                <a:schemeClr val="bg2"/>
+              </a:solidFill>
+            </a:endParaRPr>
+          </a:p>
+        </p:txBody>
+      </p:sp>
+      <p:pic>
+        <p:nvPicPr>
+          <p:cNvPr id="19458" name="Picture 2"/>
+          <p:cNvPicPr>
+            <a:picLocks noChangeAspect="1" noChangeArrowheads="1"/>
+          </p:cNvPicPr>
+          <p:nvPr/>
+        </p:nvPicPr>
+        <p:blipFill>
+          <a:blip r:embed="rId2" cstate="print"/>
+          <a:srcRect/>
+          <a:stretch>
+            <a:fillRect/>
+          </a:stretch>
+        </p:blipFill>
+        <p:spPr bwMode="auto">
+          <a:xfrm>
+            <a:off x="609600" y="4267200"/>
+            <a:ext cx="7924800" cy="2209800"/>
+          </a:xfrm>
+          <a:prstGeom prst="rect">
+            <a:avLst/>
+          </a:prstGeom>
+          <a:noFill/>
+          <a:ln w="9525">
+            <a:noFill/>
+            <a:miter lim="800000"/>
+            <a:headEnd/>
+            <a:tailEnd/>
+          </a:ln>
+        </p:spPr>
+      </p:pic>
+    </p:spTree>
+  </p:cSld>
+  <p:clrMapOvr>
+    <a:masterClrMapping/>
+  </p:clrMapOvr>
 </p:sld>
 </file>
 

</xml_diff>